<commit_message>
- lecture 19 - exercise 7 - created space for it - reknitting schedule
</commit_message>
<xml_diff>
--- a/materials/lecture_18.pptx
+++ b/materials/lecture_18.pptx
@@ -5,7 +5,7 @@
     <p:sldMasterId id="2147483660" r:id="rId1"/>
   </p:sldMasterIdLst>
   <p:notesMasterIdLst>
-    <p:notesMasterId r:id="rId9"/>
+    <p:notesMasterId r:id="rId10"/>
   </p:notesMasterIdLst>
   <p:sldIdLst>
     <p:sldId id="256" r:id="rId2"/>
@@ -15,6 +15,7 @@
     <p:sldId id="261" r:id="rId6"/>
     <p:sldId id="262" r:id="rId7"/>
     <p:sldId id="263" r:id="rId8"/>
+    <p:sldId id="265" r:id="rId9"/>
   </p:sldIdLst>
   <p:sldSz cx="12192000" cy="3657600"/>
   <p:notesSz cx="6858000" cy="9144000"/>
@@ -113,6 +114,11 @@
       </a:defRPr>
     </a:lvl9pPr>
   </p:defaultTextStyle>
+  <p:extLst>
+    <p:ext uri="{EFAFB233-063F-42B5-8137-9DF3F51BA10A}">
+      <p15:sldGuideLst xmlns:p15="http://schemas.microsoft.com/office/powerpoint/2012/main"/>
+    </p:ext>
+  </p:extLst>
 </p:presentation>
 </file>
 
@@ -1209,6 +1215,117 @@
     <p:extLst>
       <p:ext uri="{BB962C8B-B14F-4D97-AF65-F5344CB8AC3E}">
         <p14:creationId xmlns:p14="http://schemas.microsoft.com/office/powerpoint/2010/main" val="107673622"/>
+      </p:ext>
+    </p:extLst>
+  </p:cSld>
+  <p:clrMapOvr>
+    <a:masterClrMapping/>
+  </p:clrMapOvr>
+</p:notes>
+</file>
+
+<file path=ppt/notesSlides/notesSlide8.xml><?xml version="1.0" encoding="utf-8"?>
+<p:notes xmlns:a="http://schemas.openxmlformats.org/drawingml/2006/main" xmlns:r="http://schemas.openxmlformats.org/officeDocument/2006/relationships" xmlns:p="http://schemas.openxmlformats.org/presentationml/2006/main">
+  <p:cSld>
+    <p:spTree>
+      <p:nvGrpSpPr>
+        <p:cNvPr id="1" name="">
+          <a:extLst>
+            <a:ext uri="{FF2B5EF4-FFF2-40B4-BE49-F238E27FC236}">
+              <a16:creationId xmlns:a16="http://schemas.microsoft.com/office/drawing/2014/main" id="{E3B61FEF-08F4-02A3-4276-DA2E39732727}"/>
+            </a:ext>
+          </a:extLst>
+        </p:cNvPr>
+        <p:cNvGrpSpPr/>
+        <p:nvPr/>
+      </p:nvGrpSpPr>
+      <p:grpSpPr>
+        <a:xfrm>
+          <a:off x="0" y="0"/>
+          <a:ext cx="0" cy="0"/>
+          <a:chOff x="0" y="0"/>
+          <a:chExt cx="0" cy="0"/>
+        </a:xfrm>
+      </p:grpSpPr>
+      <p:sp>
+        <p:nvSpPr>
+          <p:cNvPr id="2" name="Slide Image Placeholder 1">
+            <a:extLst>
+              <a:ext uri="{FF2B5EF4-FFF2-40B4-BE49-F238E27FC236}">
+                <a16:creationId xmlns:a16="http://schemas.microsoft.com/office/drawing/2014/main" id="{33E33B99-5022-983E-16CB-641F6B25B566}"/>
+              </a:ext>
+            </a:extLst>
+          </p:cNvPr>
+          <p:cNvSpPr>
+            <a:spLocks noGrp="1" noRot="1" noChangeAspect="1"/>
+          </p:cNvSpPr>
+          <p:nvPr>
+            <p:ph type="sldImg"/>
+          </p:nvPr>
+        </p:nvSpPr>
+        <p:spPr/>
+      </p:sp>
+      <p:sp>
+        <p:nvSpPr>
+          <p:cNvPr id="3" name="Notes Placeholder 2">
+            <a:extLst>
+              <a:ext uri="{FF2B5EF4-FFF2-40B4-BE49-F238E27FC236}">
+                <a16:creationId xmlns:a16="http://schemas.microsoft.com/office/drawing/2014/main" id="{4683EA68-ED4F-9323-E131-906FCFC37578}"/>
+              </a:ext>
+            </a:extLst>
+          </p:cNvPr>
+          <p:cNvSpPr>
+            <a:spLocks noGrp="1"/>
+          </p:cNvSpPr>
+          <p:nvPr>
+            <p:ph type="body" idx="1"/>
+          </p:nvPr>
+        </p:nvSpPr>
+        <p:spPr/>
+        <p:txBody>
+          <a:bodyPr/>
+          <a:lstStyle/>
+          <a:p>
+            <a:r>
+              <a:rPr lang="en-US" dirty="0"/>
+              <a:t>Double nested design</a:t>
+            </a:r>
+          </a:p>
+        </p:txBody>
+      </p:sp>
+      <p:sp>
+        <p:nvSpPr>
+          <p:cNvPr id="4" name="Slide Number Placeholder 3">
+            <a:extLst>
+              <a:ext uri="{FF2B5EF4-FFF2-40B4-BE49-F238E27FC236}">
+                <a16:creationId xmlns:a16="http://schemas.microsoft.com/office/drawing/2014/main" id="{E5F7F6BF-BA70-A963-FB0B-AFE55EB35141}"/>
+              </a:ext>
+            </a:extLst>
+          </p:cNvPr>
+          <p:cNvSpPr>
+            <a:spLocks noGrp="1"/>
+          </p:cNvSpPr>
+          <p:nvPr>
+            <p:ph type="sldNum" sz="quarter" idx="5"/>
+          </p:nvPr>
+        </p:nvSpPr>
+        <p:spPr/>
+        <p:txBody>
+          <a:bodyPr/>
+          <a:lstStyle/>
+          <a:p>
+            <a:fld id="{F7C71EB2-F41A-BC4A-9EA3-D6C045544FCF}" type="slidenum">
+              <a:rPr lang="en-US" smtClean="0"/>
+              <a:t>8</a:t>
+            </a:fld>
+            <a:endParaRPr lang="en-US"/>
+          </a:p>
+        </p:txBody>
+      </p:sp>
+    </p:spTree>
+    <p:extLst>
+      <p:ext uri="{BB962C8B-B14F-4D97-AF65-F5344CB8AC3E}">
+        <p14:creationId xmlns:p14="http://schemas.microsoft.com/office/powerpoint/2010/main" val="2845369009"/>
       </p:ext>
     </p:extLst>
   </p:cSld>
@@ -15554,6 +15671,4379 @@
     <p:extLst>
       <p:ext uri="{BB962C8B-B14F-4D97-AF65-F5344CB8AC3E}">
         <p14:creationId xmlns:p14="http://schemas.microsoft.com/office/powerpoint/2010/main" val="84652921"/>
+      </p:ext>
+    </p:extLst>
+  </p:cSld>
+  <p:clrMapOvr>
+    <a:masterClrMapping/>
+  </p:clrMapOvr>
+</p:sld>
+</file>
+
+<file path=ppt/slides/slide8.xml><?xml version="1.0" encoding="utf-8"?>
+<p:sld xmlns:a="http://schemas.openxmlformats.org/drawingml/2006/main" xmlns:r="http://schemas.openxmlformats.org/officeDocument/2006/relationships" xmlns:p="http://schemas.openxmlformats.org/presentationml/2006/main">
+  <p:cSld>
+    <p:spTree>
+      <p:nvGrpSpPr>
+        <p:cNvPr id="1" name="">
+          <a:extLst>
+            <a:ext uri="{FF2B5EF4-FFF2-40B4-BE49-F238E27FC236}">
+              <a16:creationId xmlns:a16="http://schemas.microsoft.com/office/drawing/2014/main" id="{73F2E425-9715-28DD-99B9-5F69F65BC221}"/>
+            </a:ext>
+          </a:extLst>
+        </p:cNvPr>
+        <p:cNvGrpSpPr/>
+        <p:nvPr/>
+      </p:nvGrpSpPr>
+      <p:grpSpPr>
+        <a:xfrm>
+          <a:off x="0" y="0"/>
+          <a:ext cx="0" cy="0"/>
+          <a:chOff x="0" y="0"/>
+          <a:chExt cx="0" cy="0"/>
+        </a:xfrm>
+      </p:grpSpPr>
+      <p:sp>
+        <p:nvSpPr>
+          <p:cNvPr id="6" name="Rectangle 5">
+            <a:extLst>
+              <a:ext uri="{FF2B5EF4-FFF2-40B4-BE49-F238E27FC236}">
+                <a16:creationId xmlns:a16="http://schemas.microsoft.com/office/drawing/2014/main" id="{A940B7B2-7E29-B38B-E950-39E3B18BC5A6}"/>
+              </a:ext>
+            </a:extLst>
+          </p:cNvPr>
+          <p:cNvSpPr/>
+          <p:nvPr/>
+        </p:nvSpPr>
+        <p:spPr>
+          <a:xfrm>
+            <a:off x="377328" y="344219"/>
+            <a:ext cx="2475202" cy="2651113"/>
+          </a:xfrm>
+          <a:prstGeom prst="rect">
+            <a:avLst/>
+          </a:prstGeom>
+          <a:noFill/>
+          <a:ln w="88900"/>
+        </p:spPr>
+        <p:style>
+          <a:lnRef idx="2">
+            <a:schemeClr val="accent1">
+              <a:shade val="15000"/>
+            </a:schemeClr>
+          </a:lnRef>
+          <a:fillRef idx="1">
+            <a:schemeClr val="accent1"/>
+          </a:fillRef>
+          <a:effectRef idx="0">
+            <a:schemeClr val="accent1"/>
+          </a:effectRef>
+          <a:fontRef idx="minor">
+            <a:schemeClr val="lt1"/>
+          </a:fontRef>
+        </p:style>
+        <p:txBody>
+          <a:bodyPr rtlCol="0" anchor="ctr"/>
+          <a:lstStyle/>
+          <a:p>
+            <a:pPr algn="ctr"/>
+            <a:endParaRPr lang="en-US"/>
+          </a:p>
+        </p:txBody>
+      </p:sp>
+      <p:sp>
+        <p:nvSpPr>
+          <p:cNvPr id="7" name="Rectangle 6">
+            <a:extLst>
+              <a:ext uri="{FF2B5EF4-FFF2-40B4-BE49-F238E27FC236}">
+                <a16:creationId xmlns:a16="http://schemas.microsoft.com/office/drawing/2014/main" id="{FEBB2834-0961-D428-0E93-4673FA797D21}"/>
+              </a:ext>
+            </a:extLst>
+          </p:cNvPr>
+          <p:cNvSpPr/>
+          <p:nvPr/>
+        </p:nvSpPr>
+        <p:spPr>
+          <a:xfrm>
+            <a:off x="3243111" y="344218"/>
+            <a:ext cx="2475202" cy="2651113"/>
+          </a:xfrm>
+          <a:prstGeom prst="rect">
+            <a:avLst/>
+          </a:prstGeom>
+          <a:noFill/>
+          <a:ln w="88900"/>
+        </p:spPr>
+        <p:style>
+          <a:lnRef idx="2">
+            <a:schemeClr val="accent1">
+              <a:shade val="15000"/>
+            </a:schemeClr>
+          </a:lnRef>
+          <a:fillRef idx="1">
+            <a:schemeClr val="accent1"/>
+          </a:fillRef>
+          <a:effectRef idx="0">
+            <a:schemeClr val="accent1"/>
+          </a:effectRef>
+          <a:fontRef idx="minor">
+            <a:schemeClr val="lt1"/>
+          </a:fontRef>
+        </p:style>
+        <p:txBody>
+          <a:bodyPr rtlCol="0" anchor="ctr"/>
+          <a:lstStyle/>
+          <a:p>
+            <a:pPr algn="ctr"/>
+            <a:endParaRPr lang="en-US"/>
+          </a:p>
+        </p:txBody>
+      </p:sp>
+      <p:sp>
+        <p:nvSpPr>
+          <p:cNvPr id="8" name="Rectangle 7">
+            <a:extLst>
+              <a:ext uri="{FF2B5EF4-FFF2-40B4-BE49-F238E27FC236}">
+                <a16:creationId xmlns:a16="http://schemas.microsoft.com/office/drawing/2014/main" id="{D1539B26-1342-53B0-2300-93DA6EACD304}"/>
+              </a:ext>
+            </a:extLst>
+          </p:cNvPr>
+          <p:cNvSpPr/>
+          <p:nvPr/>
+        </p:nvSpPr>
+        <p:spPr>
+          <a:xfrm>
+            <a:off x="6108894" y="344217"/>
+            <a:ext cx="2475202" cy="2651113"/>
+          </a:xfrm>
+          <a:prstGeom prst="rect">
+            <a:avLst/>
+          </a:prstGeom>
+          <a:noFill/>
+          <a:ln w="88900"/>
+        </p:spPr>
+        <p:style>
+          <a:lnRef idx="2">
+            <a:schemeClr val="accent1">
+              <a:shade val="15000"/>
+            </a:schemeClr>
+          </a:lnRef>
+          <a:fillRef idx="1">
+            <a:schemeClr val="accent1"/>
+          </a:fillRef>
+          <a:effectRef idx="0">
+            <a:schemeClr val="accent1"/>
+          </a:effectRef>
+          <a:fontRef idx="minor">
+            <a:schemeClr val="lt1"/>
+          </a:fontRef>
+        </p:style>
+        <p:txBody>
+          <a:bodyPr rtlCol="0" anchor="ctr"/>
+          <a:lstStyle/>
+          <a:p>
+            <a:pPr algn="ctr"/>
+            <a:endParaRPr lang="en-US"/>
+          </a:p>
+        </p:txBody>
+      </p:sp>
+      <p:sp>
+        <p:nvSpPr>
+          <p:cNvPr id="10" name="TextBox 9">
+            <a:extLst>
+              <a:ext uri="{FF2B5EF4-FFF2-40B4-BE49-F238E27FC236}">
+                <a16:creationId xmlns:a16="http://schemas.microsoft.com/office/drawing/2014/main" id="{9217559F-470E-91A9-92BE-2FFF0EB13393}"/>
+              </a:ext>
+            </a:extLst>
+          </p:cNvPr>
+          <p:cNvSpPr txBox="1"/>
+          <p:nvPr/>
+        </p:nvSpPr>
+        <p:spPr>
+          <a:xfrm>
+            <a:off x="8761724" y="1113181"/>
+            <a:ext cx="600937" cy="861774"/>
+          </a:xfrm>
+          <a:prstGeom prst="rect">
+            <a:avLst/>
+          </a:prstGeom>
+          <a:noFill/>
+        </p:spPr>
+        <p:txBody>
+          <a:bodyPr wrap="square" rtlCol="0">
+            <a:spAutoFit/>
+          </a:bodyPr>
+          <a:lstStyle/>
+          <a:p>
+            <a:r>
+              <a:rPr lang="en-US" sz="5000" dirty="0"/>
+              <a:t>…</a:t>
+            </a:r>
+          </a:p>
+        </p:txBody>
+      </p:sp>
+      <p:sp>
+        <p:nvSpPr>
+          <p:cNvPr id="11" name="TextBox 10">
+            <a:extLst>
+              <a:ext uri="{FF2B5EF4-FFF2-40B4-BE49-F238E27FC236}">
+                <a16:creationId xmlns:a16="http://schemas.microsoft.com/office/drawing/2014/main" id="{CB4CBDE9-469C-22B9-861F-ABF8F74FC6B5}"/>
+              </a:ext>
+            </a:extLst>
+          </p:cNvPr>
+          <p:cNvSpPr txBox="1"/>
+          <p:nvPr/>
+        </p:nvSpPr>
+        <p:spPr>
+          <a:xfrm>
+            <a:off x="377328" y="3074854"/>
+            <a:ext cx="2475202" cy="477054"/>
+          </a:xfrm>
+          <a:prstGeom prst="rect">
+            <a:avLst/>
+          </a:prstGeom>
+          <a:noFill/>
+        </p:spPr>
+        <p:txBody>
+          <a:bodyPr wrap="square" rtlCol="0">
+            <a:spAutoFit/>
+          </a:bodyPr>
+          <a:lstStyle/>
+          <a:p>
+            <a:pPr algn="ctr"/>
+            <a:r>
+              <a:rPr lang="en-US" sz="2500" dirty="0"/>
+              <a:t>Field 1</a:t>
+            </a:r>
+          </a:p>
+        </p:txBody>
+      </p:sp>
+      <p:sp>
+        <p:nvSpPr>
+          <p:cNvPr id="12" name="TextBox 11">
+            <a:extLst>
+              <a:ext uri="{FF2B5EF4-FFF2-40B4-BE49-F238E27FC236}">
+                <a16:creationId xmlns:a16="http://schemas.microsoft.com/office/drawing/2014/main" id="{6A87C7B7-32EC-7B26-C080-A0C15973A6A9}"/>
+              </a:ext>
+            </a:extLst>
+          </p:cNvPr>
+          <p:cNvSpPr txBox="1"/>
+          <p:nvPr/>
+        </p:nvSpPr>
+        <p:spPr>
+          <a:xfrm>
+            <a:off x="3243111" y="3074854"/>
+            <a:ext cx="2475202" cy="477054"/>
+          </a:xfrm>
+          <a:prstGeom prst="rect">
+            <a:avLst/>
+          </a:prstGeom>
+          <a:noFill/>
+        </p:spPr>
+        <p:txBody>
+          <a:bodyPr wrap="square" rtlCol="0">
+            <a:spAutoFit/>
+          </a:bodyPr>
+          <a:lstStyle/>
+          <a:p>
+            <a:pPr algn="ctr"/>
+            <a:r>
+              <a:rPr lang="en-US" sz="2500" dirty="0"/>
+              <a:t>Field 2</a:t>
+            </a:r>
+          </a:p>
+        </p:txBody>
+      </p:sp>
+      <p:sp>
+        <p:nvSpPr>
+          <p:cNvPr id="13" name="TextBox 12">
+            <a:extLst>
+              <a:ext uri="{FF2B5EF4-FFF2-40B4-BE49-F238E27FC236}">
+                <a16:creationId xmlns:a16="http://schemas.microsoft.com/office/drawing/2014/main" id="{57292E84-AABA-D1B3-506B-7EF6335C9C91}"/>
+              </a:ext>
+            </a:extLst>
+          </p:cNvPr>
+          <p:cNvSpPr txBox="1"/>
+          <p:nvPr/>
+        </p:nvSpPr>
+        <p:spPr>
+          <a:xfrm>
+            <a:off x="6108894" y="3074854"/>
+            <a:ext cx="2475202" cy="477054"/>
+          </a:xfrm>
+          <a:prstGeom prst="rect">
+            <a:avLst/>
+          </a:prstGeom>
+          <a:noFill/>
+        </p:spPr>
+        <p:txBody>
+          <a:bodyPr wrap="square" rtlCol="0">
+            <a:spAutoFit/>
+          </a:bodyPr>
+          <a:lstStyle/>
+          <a:p>
+            <a:pPr algn="ctr"/>
+            <a:r>
+              <a:rPr lang="en-US" sz="2500" dirty="0"/>
+              <a:t>Field 3</a:t>
+            </a:r>
+          </a:p>
+        </p:txBody>
+      </p:sp>
+      <p:sp>
+        <p:nvSpPr>
+          <p:cNvPr id="14" name="TextBox 13">
+            <a:extLst>
+              <a:ext uri="{FF2B5EF4-FFF2-40B4-BE49-F238E27FC236}">
+                <a16:creationId xmlns:a16="http://schemas.microsoft.com/office/drawing/2014/main" id="{A8658B4C-4FB4-CF90-A4AF-AD0CC3DAC76E}"/>
+              </a:ext>
+            </a:extLst>
+          </p:cNvPr>
+          <p:cNvSpPr txBox="1"/>
+          <p:nvPr/>
+        </p:nvSpPr>
+        <p:spPr>
+          <a:xfrm>
+            <a:off x="9527954" y="3074854"/>
+            <a:ext cx="2475202" cy="477054"/>
+          </a:xfrm>
+          <a:prstGeom prst="rect">
+            <a:avLst/>
+          </a:prstGeom>
+          <a:noFill/>
+        </p:spPr>
+        <p:txBody>
+          <a:bodyPr wrap="square" rtlCol="0">
+            <a:spAutoFit/>
+          </a:bodyPr>
+          <a:lstStyle/>
+          <a:p>
+            <a:pPr algn="ctr"/>
+            <a:r>
+              <a:rPr lang="en-US" sz="2500" dirty="0"/>
+              <a:t>Field </a:t>
+            </a:r>
+            <a:r>
+              <a:rPr lang="en-US" sz="2500" i="1" dirty="0"/>
+              <a:t>n</a:t>
+            </a:r>
+            <a:endParaRPr lang="en-US" sz="2500" dirty="0"/>
+          </a:p>
+        </p:txBody>
+      </p:sp>
+      <p:sp>
+        <p:nvSpPr>
+          <p:cNvPr id="16" name="Rectangle 15">
+            <a:extLst>
+              <a:ext uri="{FF2B5EF4-FFF2-40B4-BE49-F238E27FC236}">
+                <a16:creationId xmlns:a16="http://schemas.microsoft.com/office/drawing/2014/main" id="{A8BD1044-5D56-9223-B3A4-45D6E8136B8F}"/>
+              </a:ext>
+            </a:extLst>
+          </p:cNvPr>
+          <p:cNvSpPr/>
+          <p:nvPr/>
+        </p:nvSpPr>
+        <p:spPr>
+          <a:xfrm>
+            <a:off x="463543" y="430378"/>
+            <a:ext cx="2304288" cy="1239395"/>
+          </a:xfrm>
+          <a:prstGeom prst="rect">
+            <a:avLst/>
+          </a:prstGeom>
+          <a:noFill/>
+          <a:ln w="88900">
+            <a:solidFill>
+              <a:schemeClr val="tx1">
+                <a:lumMod val="50000"/>
+                <a:lumOff val="50000"/>
+              </a:schemeClr>
+            </a:solidFill>
+          </a:ln>
+        </p:spPr>
+        <p:style>
+          <a:lnRef idx="2">
+            <a:schemeClr val="accent1">
+              <a:shade val="15000"/>
+            </a:schemeClr>
+          </a:lnRef>
+          <a:fillRef idx="1">
+            <a:schemeClr val="accent1"/>
+          </a:fillRef>
+          <a:effectRef idx="0">
+            <a:schemeClr val="accent1"/>
+          </a:effectRef>
+          <a:fontRef idx="minor">
+            <a:schemeClr val="lt1"/>
+          </a:fontRef>
+        </p:style>
+        <p:txBody>
+          <a:bodyPr rtlCol="0" anchor="t"/>
+          <a:lstStyle/>
+          <a:p>
+            <a:pPr algn="ctr"/>
+            <a:r>
+              <a:rPr lang="en-US" dirty="0">
+                <a:solidFill>
+                  <a:schemeClr val="tx1"/>
+                </a:solidFill>
+              </a:rPr>
+              <a:t>Bison +</a:t>
+            </a:r>
+          </a:p>
+        </p:txBody>
+      </p:sp>
+      <p:sp>
+        <p:nvSpPr>
+          <p:cNvPr id="17" name="Rectangle 16">
+            <a:extLst>
+              <a:ext uri="{FF2B5EF4-FFF2-40B4-BE49-F238E27FC236}">
+                <a16:creationId xmlns:a16="http://schemas.microsoft.com/office/drawing/2014/main" id="{953CA23D-A263-BEB6-0595-4F1F2BB4E528}"/>
+              </a:ext>
+            </a:extLst>
+          </p:cNvPr>
+          <p:cNvSpPr/>
+          <p:nvPr/>
+        </p:nvSpPr>
+        <p:spPr>
+          <a:xfrm>
+            <a:off x="462785" y="1669773"/>
+            <a:ext cx="2304288" cy="1239395"/>
+          </a:xfrm>
+          <a:prstGeom prst="rect">
+            <a:avLst/>
+          </a:prstGeom>
+          <a:noFill/>
+          <a:ln w="88900">
+            <a:solidFill>
+              <a:schemeClr val="tx1">
+                <a:lumMod val="50000"/>
+                <a:lumOff val="50000"/>
+              </a:schemeClr>
+            </a:solidFill>
+          </a:ln>
+        </p:spPr>
+        <p:style>
+          <a:lnRef idx="2">
+            <a:schemeClr val="accent1">
+              <a:shade val="15000"/>
+            </a:schemeClr>
+          </a:lnRef>
+          <a:fillRef idx="1">
+            <a:schemeClr val="accent1"/>
+          </a:fillRef>
+          <a:effectRef idx="0">
+            <a:schemeClr val="accent1"/>
+          </a:effectRef>
+          <a:fontRef idx="minor">
+            <a:schemeClr val="lt1"/>
+          </a:fontRef>
+        </p:style>
+        <p:txBody>
+          <a:bodyPr rtlCol="0" anchor="b"/>
+          <a:lstStyle/>
+          <a:p>
+            <a:pPr algn="ctr"/>
+            <a:r>
+              <a:rPr lang="en-US" dirty="0">
+                <a:solidFill>
+                  <a:schemeClr val="tx1"/>
+                </a:solidFill>
+              </a:rPr>
+              <a:t>Bison -</a:t>
+            </a:r>
+          </a:p>
+        </p:txBody>
+      </p:sp>
+      <p:sp>
+        <p:nvSpPr>
+          <p:cNvPr id="19" name="Rectangle 18">
+            <a:extLst>
+              <a:ext uri="{FF2B5EF4-FFF2-40B4-BE49-F238E27FC236}">
+                <a16:creationId xmlns:a16="http://schemas.microsoft.com/office/drawing/2014/main" id="{AC16F8D6-FC4D-15E3-F923-02A7AA7548E6}"/>
+              </a:ext>
+            </a:extLst>
+          </p:cNvPr>
+          <p:cNvSpPr/>
+          <p:nvPr/>
+        </p:nvSpPr>
+        <p:spPr>
+          <a:xfrm>
+            <a:off x="3332298" y="430378"/>
+            <a:ext cx="2304288" cy="1239395"/>
+          </a:xfrm>
+          <a:prstGeom prst="rect">
+            <a:avLst/>
+          </a:prstGeom>
+          <a:noFill/>
+          <a:ln w="88900">
+            <a:solidFill>
+              <a:schemeClr val="tx1">
+                <a:lumMod val="50000"/>
+                <a:lumOff val="50000"/>
+              </a:schemeClr>
+            </a:solidFill>
+          </a:ln>
+        </p:spPr>
+        <p:style>
+          <a:lnRef idx="2">
+            <a:schemeClr val="accent1">
+              <a:shade val="15000"/>
+            </a:schemeClr>
+          </a:lnRef>
+          <a:fillRef idx="1">
+            <a:schemeClr val="accent1"/>
+          </a:fillRef>
+          <a:effectRef idx="0">
+            <a:schemeClr val="accent1"/>
+          </a:effectRef>
+          <a:fontRef idx="minor">
+            <a:schemeClr val="lt1"/>
+          </a:fontRef>
+        </p:style>
+        <p:txBody>
+          <a:bodyPr rtlCol="0" anchor="ctr"/>
+          <a:lstStyle/>
+          <a:p>
+            <a:pPr algn="ctr"/>
+            <a:endParaRPr lang="en-US" dirty="0">
+              <a:solidFill>
+                <a:schemeClr val="tx1"/>
+              </a:solidFill>
+            </a:endParaRPr>
+          </a:p>
+        </p:txBody>
+      </p:sp>
+      <p:sp>
+        <p:nvSpPr>
+          <p:cNvPr id="20" name="Rectangle 19">
+            <a:extLst>
+              <a:ext uri="{FF2B5EF4-FFF2-40B4-BE49-F238E27FC236}">
+                <a16:creationId xmlns:a16="http://schemas.microsoft.com/office/drawing/2014/main" id="{CD7A27D2-FCB9-AFDD-AD91-A7B84855DF0F}"/>
+              </a:ext>
+            </a:extLst>
+          </p:cNvPr>
+          <p:cNvSpPr/>
+          <p:nvPr/>
+        </p:nvSpPr>
+        <p:spPr>
+          <a:xfrm>
+            <a:off x="3331540" y="1669773"/>
+            <a:ext cx="2304288" cy="1239395"/>
+          </a:xfrm>
+          <a:prstGeom prst="rect">
+            <a:avLst/>
+          </a:prstGeom>
+          <a:noFill/>
+          <a:ln w="88900">
+            <a:solidFill>
+              <a:schemeClr val="tx1">
+                <a:lumMod val="50000"/>
+                <a:lumOff val="50000"/>
+              </a:schemeClr>
+            </a:solidFill>
+          </a:ln>
+        </p:spPr>
+        <p:style>
+          <a:lnRef idx="2">
+            <a:schemeClr val="accent1">
+              <a:shade val="15000"/>
+            </a:schemeClr>
+          </a:lnRef>
+          <a:fillRef idx="1">
+            <a:schemeClr val="accent1"/>
+          </a:fillRef>
+          <a:effectRef idx="0">
+            <a:schemeClr val="accent1"/>
+          </a:effectRef>
+          <a:fontRef idx="minor">
+            <a:schemeClr val="lt1"/>
+          </a:fontRef>
+        </p:style>
+        <p:txBody>
+          <a:bodyPr rtlCol="0" anchor="ctr"/>
+          <a:lstStyle/>
+          <a:p>
+            <a:pPr algn="ctr"/>
+            <a:endParaRPr lang="en-US" dirty="0">
+              <a:solidFill>
+                <a:schemeClr val="tx1"/>
+              </a:solidFill>
+            </a:endParaRPr>
+          </a:p>
+        </p:txBody>
+      </p:sp>
+      <p:sp>
+        <p:nvSpPr>
+          <p:cNvPr id="21" name="Rectangle 20">
+            <a:extLst>
+              <a:ext uri="{FF2B5EF4-FFF2-40B4-BE49-F238E27FC236}">
+                <a16:creationId xmlns:a16="http://schemas.microsoft.com/office/drawing/2014/main" id="{AA017993-8CAC-0A05-2767-997F1E83627E}"/>
+              </a:ext>
+            </a:extLst>
+          </p:cNvPr>
+          <p:cNvSpPr/>
+          <p:nvPr/>
+        </p:nvSpPr>
+        <p:spPr>
+          <a:xfrm>
+            <a:off x="6198081" y="430378"/>
+            <a:ext cx="2304288" cy="1239395"/>
+          </a:xfrm>
+          <a:prstGeom prst="rect">
+            <a:avLst/>
+          </a:prstGeom>
+          <a:noFill/>
+          <a:ln w="88900">
+            <a:solidFill>
+              <a:schemeClr val="tx1">
+                <a:lumMod val="50000"/>
+                <a:lumOff val="50000"/>
+              </a:schemeClr>
+            </a:solidFill>
+          </a:ln>
+        </p:spPr>
+        <p:style>
+          <a:lnRef idx="2">
+            <a:schemeClr val="accent1">
+              <a:shade val="15000"/>
+            </a:schemeClr>
+          </a:lnRef>
+          <a:fillRef idx="1">
+            <a:schemeClr val="accent1"/>
+          </a:fillRef>
+          <a:effectRef idx="0">
+            <a:schemeClr val="accent1"/>
+          </a:effectRef>
+          <a:fontRef idx="minor">
+            <a:schemeClr val="lt1"/>
+          </a:fontRef>
+        </p:style>
+        <p:txBody>
+          <a:bodyPr rtlCol="0" anchor="ctr"/>
+          <a:lstStyle/>
+          <a:p>
+            <a:pPr algn="ctr"/>
+            <a:endParaRPr lang="en-US" dirty="0">
+              <a:solidFill>
+                <a:schemeClr val="tx1"/>
+              </a:solidFill>
+            </a:endParaRPr>
+          </a:p>
+        </p:txBody>
+      </p:sp>
+      <p:sp>
+        <p:nvSpPr>
+          <p:cNvPr id="22" name="Rectangle 21">
+            <a:extLst>
+              <a:ext uri="{FF2B5EF4-FFF2-40B4-BE49-F238E27FC236}">
+                <a16:creationId xmlns:a16="http://schemas.microsoft.com/office/drawing/2014/main" id="{7EE68123-E62F-656F-D03F-AC3581512F9E}"/>
+              </a:ext>
+            </a:extLst>
+          </p:cNvPr>
+          <p:cNvSpPr/>
+          <p:nvPr/>
+        </p:nvSpPr>
+        <p:spPr>
+          <a:xfrm>
+            <a:off x="6197323" y="1669773"/>
+            <a:ext cx="2304288" cy="1239395"/>
+          </a:xfrm>
+          <a:prstGeom prst="rect">
+            <a:avLst/>
+          </a:prstGeom>
+          <a:noFill/>
+          <a:ln w="88900">
+            <a:solidFill>
+              <a:schemeClr val="tx1">
+                <a:lumMod val="50000"/>
+                <a:lumOff val="50000"/>
+              </a:schemeClr>
+            </a:solidFill>
+          </a:ln>
+        </p:spPr>
+        <p:style>
+          <a:lnRef idx="2">
+            <a:schemeClr val="accent1">
+              <a:shade val="15000"/>
+            </a:schemeClr>
+          </a:lnRef>
+          <a:fillRef idx="1">
+            <a:schemeClr val="accent1"/>
+          </a:fillRef>
+          <a:effectRef idx="0">
+            <a:schemeClr val="accent1"/>
+          </a:effectRef>
+          <a:fontRef idx="minor">
+            <a:schemeClr val="lt1"/>
+          </a:fontRef>
+        </p:style>
+        <p:txBody>
+          <a:bodyPr rtlCol="0" anchor="ctr"/>
+          <a:lstStyle/>
+          <a:p>
+            <a:pPr algn="ctr"/>
+            <a:endParaRPr lang="en-US" dirty="0">
+              <a:solidFill>
+                <a:schemeClr val="tx1"/>
+              </a:solidFill>
+            </a:endParaRPr>
+          </a:p>
+        </p:txBody>
+      </p:sp>
+      <p:sp>
+        <p:nvSpPr>
+          <p:cNvPr id="36" name="Rectangle 35">
+            <a:extLst>
+              <a:ext uri="{FF2B5EF4-FFF2-40B4-BE49-F238E27FC236}">
+                <a16:creationId xmlns:a16="http://schemas.microsoft.com/office/drawing/2014/main" id="{8F2A59EB-E2A8-866D-41B9-D4F832EC1FD4}"/>
+              </a:ext>
+            </a:extLst>
+          </p:cNvPr>
+          <p:cNvSpPr/>
+          <p:nvPr/>
+        </p:nvSpPr>
+        <p:spPr>
+          <a:xfrm>
+            <a:off x="3426849" y="516250"/>
+            <a:ext cx="1073768" cy="1074001"/>
+          </a:xfrm>
+          <a:prstGeom prst="rect">
+            <a:avLst/>
+          </a:prstGeom>
+          <a:noFill/>
+          <a:ln w="88900">
+            <a:solidFill>
+              <a:schemeClr val="accent1">
+                <a:lumMod val="40000"/>
+                <a:lumOff val="60000"/>
+              </a:schemeClr>
+            </a:solidFill>
+          </a:ln>
+        </p:spPr>
+        <p:style>
+          <a:lnRef idx="2">
+            <a:schemeClr val="accent1">
+              <a:shade val="15000"/>
+            </a:schemeClr>
+          </a:lnRef>
+          <a:fillRef idx="1">
+            <a:schemeClr val="accent1"/>
+          </a:fillRef>
+          <a:effectRef idx="0">
+            <a:schemeClr val="accent1"/>
+          </a:effectRef>
+          <a:fontRef idx="minor">
+            <a:schemeClr val="lt1"/>
+          </a:fontRef>
+        </p:style>
+        <p:txBody>
+          <a:bodyPr rtlCol="0" anchor="ctr"/>
+          <a:lstStyle/>
+          <a:p>
+            <a:r>
+              <a:rPr lang="en-US" dirty="0">
+                <a:solidFill>
+                  <a:schemeClr val="tx1"/>
+                </a:solidFill>
+              </a:rPr>
+              <a:t>Fert +</a:t>
+            </a:r>
+          </a:p>
+        </p:txBody>
+      </p:sp>
+      <p:sp>
+        <p:nvSpPr>
+          <p:cNvPr id="37" name="Rectangle 36">
+            <a:extLst>
+              <a:ext uri="{FF2B5EF4-FFF2-40B4-BE49-F238E27FC236}">
+                <a16:creationId xmlns:a16="http://schemas.microsoft.com/office/drawing/2014/main" id="{ED0C1714-EF06-7D66-8330-CBB8BB7C0EA6}"/>
+              </a:ext>
+            </a:extLst>
+          </p:cNvPr>
+          <p:cNvSpPr/>
+          <p:nvPr/>
+        </p:nvSpPr>
+        <p:spPr>
+          <a:xfrm>
+            <a:off x="4498781" y="516249"/>
+            <a:ext cx="1073768" cy="1074001"/>
+          </a:xfrm>
+          <a:prstGeom prst="rect">
+            <a:avLst/>
+          </a:prstGeom>
+          <a:noFill/>
+          <a:ln w="88900">
+            <a:solidFill>
+              <a:schemeClr val="accent1">
+                <a:lumMod val="40000"/>
+                <a:lumOff val="60000"/>
+              </a:schemeClr>
+            </a:solidFill>
+          </a:ln>
+        </p:spPr>
+        <p:style>
+          <a:lnRef idx="2">
+            <a:schemeClr val="accent1">
+              <a:shade val="15000"/>
+            </a:schemeClr>
+          </a:lnRef>
+          <a:fillRef idx="1">
+            <a:schemeClr val="accent1"/>
+          </a:fillRef>
+          <a:effectRef idx="0">
+            <a:schemeClr val="accent1"/>
+          </a:effectRef>
+          <a:fontRef idx="minor">
+            <a:schemeClr val="lt1"/>
+          </a:fontRef>
+        </p:style>
+        <p:txBody>
+          <a:bodyPr rtlCol="0" anchor="ctr"/>
+          <a:lstStyle/>
+          <a:p>
+            <a:pPr algn="r"/>
+            <a:r>
+              <a:rPr lang="en-US" dirty="0">
+                <a:solidFill>
+                  <a:schemeClr val="tx1"/>
+                </a:solidFill>
+              </a:rPr>
+              <a:t>Fert -</a:t>
+            </a:r>
+          </a:p>
+        </p:txBody>
+      </p:sp>
+      <p:sp>
+        <p:nvSpPr>
+          <p:cNvPr id="38" name="Rectangle 37">
+            <a:extLst>
+              <a:ext uri="{FF2B5EF4-FFF2-40B4-BE49-F238E27FC236}">
+                <a16:creationId xmlns:a16="http://schemas.microsoft.com/office/drawing/2014/main" id="{E8DEEDAD-1948-1EDB-BEA5-AA27C012A6C9}"/>
+              </a:ext>
+            </a:extLst>
+          </p:cNvPr>
+          <p:cNvSpPr/>
+          <p:nvPr/>
+        </p:nvSpPr>
+        <p:spPr>
+          <a:xfrm>
+            <a:off x="3426091" y="1749296"/>
+            <a:ext cx="1073768" cy="1074001"/>
+          </a:xfrm>
+          <a:prstGeom prst="rect">
+            <a:avLst/>
+          </a:prstGeom>
+          <a:noFill/>
+          <a:ln w="88900">
+            <a:solidFill>
+              <a:schemeClr val="accent1">
+                <a:lumMod val="40000"/>
+                <a:lumOff val="60000"/>
+              </a:schemeClr>
+            </a:solidFill>
+          </a:ln>
+        </p:spPr>
+        <p:style>
+          <a:lnRef idx="2">
+            <a:schemeClr val="accent1">
+              <a:shade val="15000"/>
+            </a:schemeClr>
+          </a:lnRef>
+          <a:fillRef idx="1">
+            <a:schemeClr val="accent1"/>
+          </a:fillRef>
+          <a:effectRef idx="0">
+            <a:schemeClr val="accent1"/>
+          </a:effectRef>
+          <a:fontRef idx="minor">
+            <a:schemeClr val="lt1"/>
+          </a:fontRef>
+        </p:style>
+        <p:txBody>
+          <a:bodyPr rtlCol="0" anchor="ctr"/>
+          <a:lstStyle/>
+          <a:p>
+            <a:endParaRPr lang="en-US" dirty="0">
+              <a:solidFill>
+                <a:schemeClr val="tx1"/>
+              </a:solidFill>
+            </a:endParaRPr>
+          </a:p>
+        </p:txBody>
+      </p:sp>
+      <p:sp>
+        <p:nvSpPr>
+          <p:cNvPr id="39" name="Rectangle 38">
+            <a:extLst>
+              <a:ext uri="{FF2B5EF4-FFF2-40B4-BE49-F238E27FC236}">
+                <a16:creationId xmlns:a16="http://schemas.microsoft.com/office/drawing/2014/main" id="{BBDA53D5-016E-6DE5-7DA5-D4091F834854}"/>
+              </a:ext>
+            </a:extLst>
+          </p:cNvPr>
+          <p:cNvSpPr/>
+          <p:nvPr/>
+        </p:nvSpPr>
+        <p:spPr>
+          <a:xfrm>
+            <a:off x="4498023" y="1749295"/>
+            <a:ext cx="1073768" cy="1074001"/>
+          </a:xfrm>
+          <a:prstGeom prst="rect">
+            <a:avLst/>
+          </a:prstGeom>
+          <a:noFill/>
+          <a:ln w="88900">
+            <a:solidFill>
+              <a:schemeClr val="accent1">
+                <a:lumMod val="40000"/>
+                <a:lumOff val="60000"/>
+              </a:schemeClr>
+            </a:solidFill>
+          </a:ln>
+        </p:spPr>
+        <p:style>
+          <a:lnRef idx="2">
+            <a:schemeClr val="accent1">
+              <a:shade val="15000"/>
+            </a:schemeClr>
+          </a:lnRef>
+          <a:fillRef idx="1">
+            <a:schemeClr val="accent1"/>
+          </a:fillRef>
+          <a:effectRef idx="0">
+            <a:schemeClr val="accent1"/>
+          </a:effectRef>
+          <a:fontRef idx="minor">
+            <a:schemeClr val="lt1"/>
+          </a:fontRef>
+        </p:style>
+        <p:txBody>
+          <a:bodyPr rtlCol="0" anchor="ctr"/>
+          <a:lstStyle/>
+          <a:p>
+            <a:pPr algn="r"/>
+            <a:endParaRPr lang="en-US" dirty="0">
+              <a:solidFill>
+                <a:schemeClr val="tx1"/>
+              </a:solidFill>
+            </a:endParaRPr>
+          </a:p>
+        </p:txBody>
+      </p:sp>
+      <p:sp>
+        <p:nvSpPr>
+          <p:cNvPr id="40" name="Rectangle 39">
+            <a:extLst>
+              <a:ext uri="{FF2B5EF4-FFF2-40B4-BE49-F238E27FC236}">
+                <a16:creationId xmlns:a16="http://schemas.microsoft.com/office/drawing/2014/main" id="{03BAC1D4-74CF-9A7A-207F-022CE286BD26}"/>
+              </a:ext>
+            </a:extLst>
+          </p:cNvPr>
+          <p:cNvSpPr/>
+          <p:nvPr/>
+        </p:nvSpPr>
+        <p:spPr>
+          <a:xfrm>
+            <a:off x="6272051" y="516248"/>
+            <a:ext cx="1073768" cy="1074001"/>
+          </a:xfrm>
+          <a:prstGeom prst="rect">
+            <a:avLst/>
+          </a:prstGeom>
+          <a:noFill/>
+          <a:ln w="88900">
+            <a:solidFill>
+              <a:schemeClr val="accent1">
+                <a:lumMod val="40000"/>
+                <a:lumOff val="60000"/>
+              </a:schemeClr>
+            </a:solidFill>
+          </a:ln>
+        </p:spPr>
+        <p:style>
+          <a:lnRef idx="2">
+            <a:schemeClr val="accent1">
+              <a:shade val="15000"/>
+            </a:schemeClr>
+          </a:lnRef>
+          <a:fillRef idx="1">
+            <a:schemeClr val="accent1"/>
+          </a:fillRef>
+          <a:effectRef idx="0">
+            <a:schemeClr val="accent1"/>
+          </a:effectRef>
+          <a:fontRef idx="minor">
+            <a:schemeClr val="lt1"/>
+          </a:fontRef>
+        </p:style>
+        <p:txBody>
+          <a:bodyPr rtlCol="0" anchor="ctr"/>
+          <a:lstStyle/>
+          <a:p>
+            <a:endParaRPr lang="en-US" dirty="0">
+              <a:solidFill>
+                <a:schemeClr val="tx1"/>
+              </a:solidFill>
+            </a:endParaRPr>
+          </a:p>
+        </p:txBody>
+      </p:sp>
+      <p:sp>
+        <p:nvSpPr>
+          <p:cNvPr id="52" name="Rectangle 51">
+            <a:extLst>
+              <a:ext uri="{FF2B5EF4-FFF2-40B4-BE49-F238E27FC236}">
+                <a16:creationId xmlns:a16="http://schemas.microsoft.com/office/drawing/2014/main" id="{17E9CABF-ED2D-4A43-AE2B-6F994261B3E7}"/>
+              </a:ext>
+            </a:extLst>
+          </p:cNvPr>
+          <p:cNvSpPr/>
+          <p:nvPr/>
+        </p:nvSpPr>
+        <p:spPr>
+          <a:xfrm>
+            <a:off x="7357235" y="516247"/>
+            <a:ext cx="1073768" cy="1074001"/>
+          </a:xfrm>
+          <a:prstGeom prst="rect">
+            <a:avLst/>
+          </a:prstGeom>
+          <a:noFill/>
+          <a:ln w="88900">
+            <a:solidFill>
+              <a:schemeClr val="accent1">
+                <a:lumMod val="40000"/>
+                <a:lumOff val="60000"/>
+              </a:schemeClr>
+            </a:solidFill>
+          </a:ln>
+        </p:spPr>
+        <p:style>
+          <a:lnRef idx="2">
+            <a:schemeClr val="accent1">
+              <a:shade val="15000"/>
+            </a:schemeClr>
+          </a:lnRef>
+          <a:fillRef idx="1">
+            <a:schemeClr val="accent1"/>
+          </a:fillRef>
+          <a:effectRef idx="0">
+            <a:schemeClr val="accent1"/>
+          </a:effectRef>
+          <a:fontRef idx="minor">
+            <a:schemeClr val="lt1"/>
+          </a:fontRef>
+        </p:style>
+        <p:txBody>
+          <a:bodyPr rtlCol="0" anchor="ctr"/>
+          <a:lstStyle/>
+          <a:p>
+            <a:pPr algn="r"/>
+            <a:endParaRPr lang="en-US" dirty="0">
+              <a:solidFill>
+                <a:schemeClr val="tx1"/>
+              </a:solidFill>
+            </a:endParaRPr>
+          </a:p>
+        </p:txBody>
+      </p:sp>
+      <p:sp>
+        <p:nvSpPr>
+          <p:cNvPr id="53" name="Rectangle 52">
+            <a:extLst>
+              <a:ext uri="{FF2B5EF4-FFF2-40B4-BE49-F238E27FC236}">
+                <a16:creationId xmlns:a16="http://schemas.microsoft.com/office/drawing/2014/main" id="{6FDA3A25-A335-2AE8-006D-27140D94A6EA}"/>
+              </a:ext>
+            </a:extLst>
+          </p:cNvPr>
+          <p:cNvSpPr/>
+          <p:nvPr/>
+        </p:nvSpPr>
+        <p:spPr>
+          <a:xfrm>
+            <a:off x="6276103" y="1749295"/>
+            <a:ext cx="1073768" cy="1074001"/>
+          </a:xfrm>
+          <a:prstGeom prst="rect">
+            <a:avLst/>
+          </a:prstGeom>
+          <a:noFill/>
+          <a:ln w="88900">
+            <a:solidFill>
+              <a:schemeClr val="accent1">
+                <a:lumMod val="40000"/>
+                <a:lumOff val="60000"/>
+              </a:schemeClr>
+            </a:solidFill>
+          </a:ln>
+        </p:spPr>
+        <p:style>
+          <a:lnRef idx="2">
+            <a:schemeClr val="accent1">
+              <a:shade val="15000"/>
+            </a:schemeClr>
+          </a:lnRef>
+          <a:fillRef idx="1">
+            <a:schemeClr val="accent1"/>
+          </a:fillRef>
+          <a:effectRef idx="0">
+            <a:schemeClr val="accent1"/>
+          </a:effectRef>
+          <a:fontRef idx="minor">
+            <a:schemeClr val="lt1"/>
+          </a:fontRef>
+        </p:style>
+        <p:txBody>
+          <a:bodyPr rtlCol="0" anchor="ctr"/>
+          <a:lstStyle/>
+          <a:p>
+            <a:endParaRPr lang="en-US" dirty="0">
+              <a:solidFill>
+                <a:schemeClr val="tx1"/>
+              </a:solidFill>
+            </a:endParaRPr>
+          </a:p>
+        </p:txBody>
+      </p:sp>
+      <p:sp>
+        <p:nvSpPr>
+          <p:cNvPr id="54" name="Rectangle 53">
+            <a:extLst>
+              <a:ext uri="{FF2B5EF4-FFF2-40B4-BE49-F238E27FC236}">
+                <a16:creationId xmlns:a16="http://schemas.microsoft.com/office/drawing/2014/main" id="{C33DF750-6DE9-DAA7-1EDF-94BB8FBD2D2B}"/>
+              </a:ext>
+            </a:extLst>
+          </p:cNvPr>
+          <p:cNvSpPr/>
+          <p:nvPr/>
+        </p:nvSpPr>
+        <p:spPr>
+          <a:xfrm>
+            <a:off x="7361287" y="1749294"/>
+            <a:ext cx="1073768" cy="1074001"/>
+          </a:xfrm>
+          <a:prstGeom prst="rect">
+            <a:avLst/>
+          </a:prstGeom>
+          <a:noFill/>
+          <a:ln w="88900">
+            <a:solidFill>
+              <a:schemeClr val="accent1">
+                <a:lumMod val="40000"/>
+                <a:lumOff val="60000"/>
+              </a:schemeClr>
+            </a:solidFill>
+          </a:ln>
+        </p:spPr>
+        <p:style>
+          <a:lnRef idx="2">
+            <a:schemeClr val="accent1">
+              <a:shade val="15000"/>
+            </a:schemeClr>
+          </a:lnRef>
+          <a:fillRef idx="1">
+            <a:schemeClr val="accent1"/>
+          </a:fillRef>
+          <a:effectRef idx="0">
+            <a:schemeClr val="accent1"/>
+          </a:effectRef>
+          <a:fontRef idx="minor">
+            <a:schemeClr val="lt1"/>
+          </a:fontRef>
+        </p:style>
+        <p:txBody>
+          <a:bodyPr rtlCol="0" anchor="ctr"/>
+          <a:lstStyle/>
+          <a:p>
+            <a:pPr algn="r"/>
+            <a:endParaRPr lang="en-US" dirty="0">
+              <a:solidFill>
+                <a:schemeClr val="tx1"/>
+              </a:solidFill>
+            </a:endParaRPr>
+          </a:p>
+        </p:txBody>
+      </p:sp>
+      <p:sp>
+        <p:nvSpPr>
+          <p:cNvPr id="55" name="Rectangle 54">
+            <a:extLst>
+              <a:ext uri="{FF2B5EF4-FFF2-40B4-BE49-F238E27FC236}">
+                <a16:creationId xmlns:a16="http://schemas.microsoft.com/office/drawing/2014/main" id="{C79B34B6-FA39-7064-4C44-E85EB6A17FA3}"/>
+              </a:ext>
+            </a:extLst>
+          </p:cNvPr>
+          <p:cNvSpPr/>
+          <p:nvPr/>
+        </p:nvSpPr>
+        <p:spPr>
+          <a:xfrm>
+            <a:off x="7438299" y="1823224"/>
+            <a:ext cx="932688" cy="331304"/>
+          </a:xfrm>
+          <a:prstGeom prst="rect">
+            <a:avLst/>
+          </a:prstGeom>
+          <a:noFill/>
+          <a:ln w="63500">
+            <a:solidFill>
+              <a:schemeClr val="accent2"/>
+            </a:solidFill>
+          </a:ln>
+        </p:spPr>
+        <p:style>
+          <a:lnRef idx="2">
+            <a:schemeClr val="accent1">
+              <a:shade val="15000"/>
+            </a:schemeClr>
+          </a:lnRef>
+          <a:fillRef idx="1">
+            <a:schemeClr val="accent1"/>
+          </a:fillRef>
+          <a:effectRef idx="0">
+            <a:schemeClr val="accent1"/>
+          </a:effectRef>
+          <a:fontRef idx="minor">
+            <a:schemeClr val="lt1"/>
+          </a:fontRef>
+        </p:style>
+        <p:txBody>
+          <a:bodyPr rtlCol="0" anchor="ctr"/>
+          <a:lstStyle/>
+          <a:p>
+            <a:pPr algn="ctr"/>
+            <a:endParaRPr lang="en-US" sz="1500" dirty="0">
+              <a:solidFill>
+                <a:schemeClr val="tx1"/>
+              </a:solidFill>
+            </a:endParaRPr>
+          </a:p>
+        </p:txBody>
+      </p:sp>
+      <p:sp>
+        <p:nvSpPr>
+          <p:cNvPr id="56" name="Rectangle 55">
+            <a:extLst>
+              <a:ext uri="{FF2B5EF4-FFF2-40B4-BE49-F238E27FC236}">
+                <a16:creationId xmlns:a16="http://schemas.microsoft.com/office/drawing/2014/main" id="{5798604F-E2B2-C351-769D-60A5C3BCD7B9}"/>
+              </a:ext>
+            </a:extLst>
+          </p:cNvPr>
+          <p:cNvSpPr/>
+          <p:nvPr/>
+        </p:nvSpPr>
+        <p:spPr>
+          <a:xfrm>
+            <a:off x="7437928" y="2153478"/>
+            <a:ext cx="932688" cy="331304"/>
+          </a:xfrm>
+          <a:prstGeom prst="rect">
+            <a:avLst/>
+          </a:prstGeom>
+          <a:noFill/>
+          <a:ln w="63500">
+            <a:solidFill>
+              <a:schemeClr val="accent2"/>
+            </a:solidFill>
+          </a:ln>
+        </p:spPr>
+        <p:style>
+          <a:lnRef idx="2">
+            <a:schemeClr val="accent1">
+              <a:shade val="15000"/>
+            </a:schemeClr>
+          </a:lnRef>
+          <a:fillRef idx="1">
+            <a:schemeClr val="accent1"/>
+          </a:fillRef>
+          <a:effectRef idx="0">
+            <a:schemeClr val="accent1"/>
+          </a:effectRef>
+          <a:fontRef idx="minor">
+            <a:schemeClr val="lt1"/>
+          </a:fontRef>
+        </p:style>
+        <p:txBody>
+          <a:bodyPr rtlCol="0" anchor="ctr"/>
+          <a:lstStyle/>
+          <a:p>
+            <a:pPr algn="ctr"/>
+            <a:endParaRPr lang="en-US" sz="1500" dirty="0">
+              <a:solidFill>
+                <a:schemeClr val="tx1"/>
+              </a:solidFill>
+            </a:endParaRPr>
+          </a:p>
+        </p:txBody>
+      </p:sp>
+      <p:sp>
+        <p:nvSpPr>
+          <p:cNvPr id="57" name="Rectangle 56">
+            <a:extLst>
+              <a:ext uri="{FF2B5EF4-FFF2-40B4-BE49-F238E27FC236}">
+                <a16:creationId xmlns:a16="http://schemas.microsoft.com/office/drawing/2014/main" id="{0292C4BF-775F-9C5C-6B6D-9F7DEDB16E2F}"/>
+              </a:ext>
+            </a:extLst>
+          </p:cNvPr>
+          <p:cNvSpPr/>
+          <p:nvPr/>
+        </p:nvSpPr>
+        <p:spPr>
+          <a:xfrm>
+            <a:off x="7438299" y="2462466"/>
+            <a:ext cx="932688" cy="331304"/>
+          </a:xfrm>
+          <a:prstGeom prst="rect">
+            <a:avLst/>
+          </a:prstGeom>
+          <a:noFill/>
+          <a:ln w="63500">
+            <a:solidFill>
+              <a:schemeClr val="accent2"/>
+            </a:solidFill>
+          </a:ln>
+        </p:spPr>
+        <p:style>
+          <a:lnRef idx="2">
+            <a:schemeClr val="accent1">
+              <a:shade val="15000"/>
+            </a:schemeClr>
+          </a:lnRef>
+          <a:fillRef idx="1">
+            <a:schemeClr val="accent1"/>
+          </a:fillRef>
+          <a:effectRef idx="0">
+            <a:schemeClr val="accent1"/>
+          </a:effectRef>
+          <a:fontRef idx="minor">
+            <a:schemeClr val="lt1"/>
+          </a:fontRef>
+        </p:style>
+        <p:txBody>
+          <a:bodyPr rtlCol="0" anchor="ctr"/>
+          <a:lstStyle/>
+          <a:p>
+            <a:pPr algn="ctr"/>
+            <a:endParaRPr lang="en-US" sz="1500" dirty="0">
+              <a:solidFill>
+                <a:schemeClr val="tx1"/>
+              </a:solidFill>
+            </a:endParaRPr>
+          </a:p>
+        </p:txBody>
+      </p:sp>
+      <p:sp>
+        <p:nvSpPr>
+          <p:cNvPr id="62" name="Rectangle 61">
+            <a:extLst>
+              <a:ext uri="{FF2B5EF4-FFF2-40B4-BE49-F238E27FC236}">
+                <a16:creationId xmlns:a16="http://schemas.microsoft.com/office/drawing/2014/main" id="{EBFE22FB-EDA2-C032-4FCC-509422C4AEF1}"/>
+              </a:ext>
+            </a:extLst>
+          </p:cNvPr>
+          <p:cNvSpPr/>
+          <p:nvPr/>
+        </p:nvSpPr>
+        <p:spPr>
+          <a:xfrm>
+            <a:off x="6362043" y="1799380"/>
+            <a:ext cx="932688" cy="331304"/>
+          </a:xfrm>
+          <a:prstGeom prst="rect">
+            <a:avLst/>
+          </a:prstGeom>
+          <a:noFill/>
+          <a:ln w="63500">
+            <a:solidFill>
+              <a:schemeClr val="accent2"/>
+            </a:solidFill>
+          </a:ln>
+        </p:spPr>
+        <p:style>
+          <a:lnRef idx="2">
+            <a:schemeClr val="accent1">
+              <a:shade val="15000"/>
+            </a:schemeClr>
+          </a:lnRef>
+          <a:fillRef idx="1">
+            <a:schemeClr val="accent1"/>
+          </a:fillRef>
+          <a:effectRef idx="0">
+            <a:schemeClr val="accent1"/>
+          </a:effectRef>
+          <a:fontRef idx="minor">
+            <a:schemeClr val="lt1"/>
+          </a:fontRef>
+        </p:style>
+        <p:txBody>
+          <a:bodyPr rtlCol="0" anchor="ctr"/>
+          <a:lstStyle/>
+          <a:p>
+            <a:pPr algn="ctr"/>
+            <a:endParaRPr lang="en-US" sz="1500" dirty="0">
+              <a:solidFill>
+                <a:schemeClr val="tx1"/>
+              </a:solidFill>
+            </a:endParaRPr>
+          </a:p>
+        </p:txBody>
+      </p:sp>
+      <p:sp>
+        <p:nvSpPr>
+          <p:cNvPr id="63" name="Rectangle 62">
+            <a:extLst>
+              <a:ext uri="{FF2B5EF4-FFF2-40B4-BE49-F238E27FC236}">
+                <a16:creationId xmlns:a16="http://schemas.microsoft.com/office/drawing/2014/main" id="{F9026BE7-5190-87B1-5E1C-32F61F340D27}"/>
+              </a:ext>
+            </a:extLst>
+          </p:cNvPr>
+          <p:cNvSpPr/>
+          <p:nvPr/>
+        </p:nvSpPr>
+        <p:spPr>
+          <a:xfrm>
+            <a:off x="6361672" y="2129634"/>
+            <a:ext cx="932688" cy="331304"/>
+          </a:xfrm>
+          <a:prstGeom prst="rect">
+            <a:avLst/>
+          </a:prstGeom>
+          <a:noFill/>
+          <a:ln w="63500">
+            <a:solidFill>
+              <a:schemeClr val="accent2"/>
+            </a:solidFill>
+          </a:ln>
+        </p:spPr>
+        <p:style>
+          <a:lnRef idx="2">
+            <a:schemeClr val="accent1">
+              <a:shade val="15000"/>
+            </a:schemeClr>
+          </a:lnRef>
+          <a:fillRef idx="1">
+            <a:schemeClr val="accent1"/>
+          </a:fillRef>
+          <a:effectRef idx="0">
+            <a:schemeClr val="accent1"/>
+          </a:effectRef>
+          <a:fontRef idx="minor">
+            <a:schemeClr val="lt1"/>
+          </a:fontRef>
+        </p:style>
+        <p:txBody>
+          <a:bodyPr rtlCol="0" anchor="ctr"/>
+          <a:lstStyle/>
+          <a:p>
+            <a:pPr algn="ctr"/>
+            <a:endParaRPr lang="en-US" sz="1500" dirty="0">
+              <a:solidFill>
+                <a:schemeClr val="tx1"/>
+              </a:solidFill>
+            </a:endParaRPr>
+          </a:p>
+        </p:txBody>
+      </p:sp>
+      <p:sp>
+        <p:nvSpPr>
+          <p:cNvPr id="64" name="Rectangle 63">
+            <a:extLst>
+              <a:ext uri="{FF2B5EF4-FFF2-40B4-BE49-F238E27FC236}">
+                <a16:creationId xmlns:a16="http://schemas.microsoft.com/office/drawing/2014/main" id="{B82EFBBB-E59F-9C52-6EFC-14ED94356F2F}"/>
+              </a:ext>
+            </a:extLst>
+          </p:cNvPr>
+          <p:cNvSpPr/>
+          <p:nvPr/>
+        </p:nvSpPr>
+        <p:spPr>
+          <a:xfrm>
+            <a:off x="6362043" y="2438622"/>
+            <a:ext cx="932688" cy="331304"/>
+          </a:xfrm>
+          <a:prstGeom prst="rect">
+            <a:avLst/>
+          </a:prstGeom>
+          <a:noFill/>
+          <a:ln w="63500">
+            <a:solidFill>
+              <a:schemeClr val="accent2"/>
+            </a:solidFill>
+          </a:ln>
+        </p:spPr>
+        <p:style>
+          <a:lnRef idx="2">
+            <a:schemeClr val="accent1">
+              <a:shade val="15000"/>
+            </a:schemeClr>
+          </a:lnRef>
+          <a:fillRef idx="1">
+            <a:schemeClr val="accent1"/>
+          </a:fillRef>
+          <a:effectRef idx="0">
+            <a:schemeClr val="accent1"/>
+          </a:effectRef>
+          <a:fontRef idx="minor">
+            <a:schemeClr val="lt1"/>
+          </a:fontRef>
+        </p:style>
+        <p:txBody>
+          <a:bodyPr rtlCol="0" anchor="ctr"/>
+          <a:lstStyle/>
+          <a:p>
+            <a:pPr algn="ctr"/>
+            <a:endParaRPr lang="en-US" sz="1500" dirty="0">
+              <a:solidFill>
+                <a:schemeClr val="tx1"/>
+              </a:solidFill>
+            </a:endParaRPr>
+          </a:p>
+        </p:txBody>
+      </p:sp>
+      <p:sp>
+        <p:nvSpPr>
+          <p:cNvPr id="65" name="Rectangle 64">
+            <a:extLst>
+              <a:ext uri="{FF2B5EF4-FFF2-40B4-BE49-F238E27FC236}">
+                <a16:creationId xmlns:a16="http://schemas.microsoft.com/office/drawing/2014/main" id="{D89A48C5-542C-26AD-F665-AE670B2379EE}"/>
+              </a:ext>
+            </a:extLst>
+          </p:cNvPr>
+          <p:cNvSpPr/>
+          <p:nvPr/>
+        </p:nvSpPr>
+        <p:spPr>
+          <a:xfrm>
+            <a:off x="6353181" y="585018"/>
+            <a:ext cx="932688" cy="331304"/>
+          </a:xfrm>
+          <a:prstGeom prst="rect">
+            <a:avLst/>
+          </a:prstGeom>
+          <a:noFill/>
+          <a:ln w="63500">
+            <a:solidFill>
+              <a:schemeClr val="accent2"/>
+            </a:solidFill>
+          </a:ln>
+        </p:spPr>
+        <p:style>
+          <a:lnRef idx="2">
+            <a:schemeClr val="accent1">
+              <a:shade val="15000"/>
+            </a:schemeClr>
+          </a:lnRef>
+          <a:fillRef idx="1">
+            <a:schemeClr val="accent1"/>
+          </a:fillRef>
+          <a:effectRef idx="0">
+            <a:schemeClr val="accent1"/>
+          </a:effectRef>
+          <a:fontRef idx="minor">
+            <a:schemeClr val="lt1"/>
+          </a:fontRef>
+        </p:style>
+        <p:txBody>
+          <a:bodyPr rtlCol="0" anchor="ctr"/>
+          <a:lstStyle/>
+          <a:p>
+            <a:pPr algn="ctr"/>
+            <a:r>
+              <a:rPr lang="en-US" sz="1500" dirty="0">
+                <a:solidFill>
+                  <a:schemeClr val="tx1"/>
+                </a:solidFill>
+              </a:rPr>
+              <a:t>H20 Low</a:t>
+            </a:r>
+          </a:p>
+        </p:txBody>
+      </p:sp>
+      <p:sp>
+        <p:nvSpPr>
+          <p:cNvPr id="66" name="Rectangle 65">
+            <a:extLst>
+              <a:ext uri="{FF2B5EF4-FFF2-40B4-BE49-F238E27FC236}">
+                <a16:creationId xmlns:a16="http://schemas.microsoft.com/office/drawing/2014/main" id="{9FE86024-A9FC-C58B-F027-511F18B503DB}"/>
+              </a:ext>
+            </a:extLst>
+          </p:cNvPr>
+          <p:cNvSpPr/>
+          <p:nvPr/>
+        </p:nvSpPr>
+        <p:spPr>
+          <a:xfrm>
+            <a:off x="6352810" y="915272"/>
+            <a:ext cx="932688" cy="331304"/>
+          </a:xfrm>
+          <a:prstGeom prst="rect">
+            <a:avLst/>
+          </a:prstGeom>
+          <a:noFill/>
+          <a:ln w="63500">
+            <a:solidFill>
+              <a:schemeClr val="accent2"/>
+            </a:solidFill>
+          </a:ln>
+        </p:spPr>
+        <p:style>
+          <a:lnRef idx="2">
+            <a:schemeClr val="accent1">
+              <a:shade val="15000"/>
+            </a:schemeClr>
+          </a:lnRef>
+          <a:fillRef idx="1">
+            <a:schemeClr val="accent1"/>
+          </a:fillRef>
+          <a:effectRef idx="0">
+            <a:schemeClr val="accent1"/>
+          </a:effectRef>
+          <a:fontRef idx="minor">
+            <a:schemeClr val="lt1"/>
+          </a:fontRef>
+        </p:style>
+        <p:txBody>
+          <a:bodyPr rtlCol="0" anchor="ctr"/>
+          <a:lstStyle/>
+          <a:p>
+            <a:pPr algn="ctr"/>
+            <a:r>
+              <a:rPr lang="en-US" sz="1500" dirty="0">
+                <a:solidFill>
+                  <a:schemeClr val="tx1"/>
+                </a:solidFill>
+              </a:rPr>
+              <a:t>H20 Med</a:t>
+            </a:r>
+          </a:p>
+        </p:txBody>
+      </p:sp>
+      <p:sp>
+        <p:nvSpPr>
+          <p:cNvPr id="67" name="Rectangle 66">
+            <a:extLst>
+              <a:ext uri="{FF2B5EF4-FFF2-40B4-BE49-F238E27FC236}">
+                <a16:creationId xmlns:a16="http://schemas.microsoft.com/office/drawing/2014/main" id="{D6DC624D-3008-1FF3-D7D0-94AF4846121F}"/>
+              </a:ext>
+            </a:extLst>
+          </p:cNvPr>
+          <p:cNvSpPr/>
+          <p:nvPr/>
+        </p:nvSpPr>
+        <p:spPr>
+          <a:xfrm>
+            <a:off x="6353181" y="1224260"/>
+            <a:ext cx="932688" cy="331304"/>
+          </a:xfrm>
+          <a:prstGeom prst="rect">
+            <a:avLst/>
+          </a:prstGeom>
+          <a:noFill/>
+          <a:ln w="63500">
+            <a:solidFill>
+              <a:schemeClr val="accent2"/>
+            </a:solidFill>
+          </a:ln>
+        </p:spPr>
+        <p:style>
+          <a:lnRef idx="2">
+            <a:schemeClr val="accent1">
+              <a:shade val="15000"/>
+            </a:schemeClr>
+          </a:lnRef>
+          <a:fillRef idx="1">
+            <a:schemeClr val="accent1"/>
+          </a:fillRef>
+          <a:effectRef idx="0">
+            <a:schemeClr val="accent1"/>
+          </a:effectRef>
+          <a:fontRef idx="minor">
+            <a:schemeClr val="lt1"/>
+          </a:fontRef>
+        </p:style>
+        <p:txBody>
+          <a:bodyPr rtlCol="0" anchor="ctr"/>
+          <a:lstStyle/>
+          <a:p>
+            <a:pPr algn="ctr"/>
+            <a:r>
+              <a:rPr lang="en-US" sz="1500" dirty="0">
+                <a:solidFill>
+                  <a:schemeClr val="tx1"/>
+                </a:solidFill>
+              </a:rPr>
+              <a:t>H20 Hi</a:t>
+            </a:r>
+          </a:p>
+        </p:txBody>
+      </p:sp>
+      <p:sp>
+        <p:nvSpPr>
+          <p:cNvPr id="68" name="Rectangle 67">
+            <a:extLst>
+              <a:ext uri="{FF2B5EF4-FFF2-40B4-BE49-F238E27FC236}">
+                <a16:creationId xmlns:a16="http://schemas.microsoft.com/office/drawing/2014/main" id="{F6FB5D49-6E8B-B69C-4780-A0D35F137076}"/>
+              </a:ext>
+            </a:extLst>
+          </p:cNvPr>
+          <p:cNvSpPr/>
+          <p:nvPr/>
+        </p:nvSpPr>
+        <p:spPr>
+          <a:xfrm>
+            <a:off x="7426578" y="585017"/>
+            <a:ext cx="932688" cy="331304"/>
+          </a:xfrm>
+          <a:prstGeom prst="rect">
+            <a:avLst/>
+          </a:prstGeom>
+          <a:noFill/>
+          <a:ln w="63500">
+            <a:solidFill>
+              <a:schemeClr val="accent2"/>
+            </a:solidFill>
+          </a:ln>
+        </p:spPr>
+        <p:style>
+          <a:lnRef idx="2">
+            <a:schemeClr val="accent1">
+              <a:shade val="15000"/>
+            </a:schemeClr>
+          </a:lnRef>
+          <a:fillRef idx="1">
+            <a:schemeClr val="accent1"/>
+          </a:fillRef>
+          <a:effectRef idx="0">
+            <a:schemeClr val="accent1"/>
+          </a:effectRef>
+          <a:fontRef idx="minor">
+            <a:schemeClr val="lt1"/>
+          </a:fontRef>
+        </p:style>
+        <p:txBody>
+          <a:bodyPr rtlCol="0" anchor="ctr"/>
+          <a:lstStyle/>
+          <a:p>
+            <a:pPr algn="ctr"/>
+            <a:endParaRPr lang="en-US" sz="1500" dirty="0">
+              <a:solidFill>
+                <a:schemeClr val="tx1"/>
+              </a:solidFill>
+            </a:endParaRPr>
+          </a:p>
+        </p:txBody>
+      </p:sp>
+      <p:sp>
+        <p:nvSpPr>
+          <p:cNvPr id="69" name="Rectangle 68">
+            <a:extLst>
+              <a:ext uri="{FF2B5EF4-FFF2-40B4-BE49-F238E27FC236}">
+                <a16:creationId xmlns:a16="http://schemas.microsoft.com/office/drawing/2014/main" id="{85047750-C01B-A10B-FA30-4F2098A441F7}"/>
+              </a:ext>
+            </a:extLst>
+          </p:cNvPr>
+          <p:cNvSpPr/>
+          <p:nvPr/>
+        </p:nvSpPr>
+        <p:spPr>
+          <a:xfrm>
+            <a:off x="7426207" y="915271"/>
+            <a:ext cx="932688" cy="331304"/>
+          </a:xfrm>
+          <a:prstGeom prst="rect">
+            <a:avLst/>
+          </a:prstGeom>
+          <a:noFill/>
+          <a:ln w="63500">
+            <a:solidFill>
+              <a:schemeClr val="accent2"/>
+            </a:solidFill>
+          </a:ln>
+        </p:spPr>
+        <p:style>
+          <a:lnRef idx="2">
+            <a:schemeClr val="accent1">
+              <a:shade val="15000"/>
+            </a:schemeClr>
+          </a:lnRef>
+          <a:fillRef idx="1">
+            <a:schemeClr val="accent1"/>
+          </a:fillRef>
+          <a:effectRef idx="0">
+            <a:schemeClr val="accent1"/>
+          </a:effectRef>
+          <a:fontRef idx="minor">
+            <a:schemeClr val="lt1"/>
+          </a:fontRef>
+        </p:style>
+        <p:txBody>
+          <a:bodyPr rtlCol="0" anchor="ctr"/>
+          <a:lstStyle/>
+          <a:p>
+            <a:pPr algn="ctr"/>
+            <a:endParaRPr lang="en-US" sz="1500" dirty="0">
+              <a:solidFill>
+                <a:schemeClr val="tx1"/>
+              </a:solidFill>
+            </a:endParaRPr>
+          </a:p>
+        </p:txBody>
+      </p:sp>
+      <p:sp>
+        <p:nvSpPr>
+          <p:cNvPr id="70" name="Rectangle 69">
+            <a:extLst>
+              <a:ext uri="{FF2B5EF4-FFF2-40B4-BE49-F238E27FC236}">
+                <a16:creationId xmlns:a16="http://schemas.microsoft.com/office/drawing/2014/main" id="{140E7F9A-9E4B-8A14-D98E-D56564115CB7}"/>
+              </a:ext>
+            </a:extLst>
+          </p:cNvPr>
+          <p:cNvSpPr/>
+          <p:nvPr/>
+        </p:nvSpPr>
+        <p:spPr>
+          <a:xfrm>
+            <a:off x="7426578" y="1224259"/>
+            <a:ext cx="932688" cy="331304"/>
+          </a:xfrm>
+          <a:prstGeom prst="rect">
+            <a:avLst/>
+          </a:prstGeom>
+          <a:noFill/>
+          <a:ln w="63500">
+            <a:solidFill>
+              <a:schemeClr val="accent2"/>
+            </a:solidFill>
+          </a:ln>
+        </p:spPr>
+        <p:style>
+          <a:lnRef idx="2">
+            <a:schemeClr val="accent1">
+              <a:shade val="15000"/>
+            </a:schemeClr>
+          </a:lnRef>
+          <a:fillRef idx="1">
+            <a:schemeClr val="accent1"/>
+          </a:fillRef>
+          <a:effectRef idx="0">
+            <a:schemeClr val="accent1"/>
+          </a:effectRef>
+          <a:fontRef idx="minor">
+            <a:schemeClr val="lt1"/>
+          </a:fontRef>
+        </p:style>
+        <p:txBody>
+          <a:bodyPr rtlCol="0" anchor="ctr"/>
+          <a:lstStyle/>
+          <a:p>
+            <a:pPr algn="ctr"/>
+            <a:endParaRPr lang="en-US" sz="1500" dirty="0">
+              <a:solidFill>
+                <a:schemeClr val="tx1"/>
+              </a:solidFill>
+            </a:endParaRPr>
+          </a:p>
+        </p:txBody>
+      </p:sp>
+      <p:sp>
+        <p:nvSpPr>
+          <p:cNvPr id="73" name="Rectangle 72">
+            <a:extLst>
+              <a:ext uri="{FF2B5EF4-FFF2-40B4-BE49-F238E27FC236}">
+                <a16:creationId xmlns:a16="http://schemas.microsoft.com/office/drawing/2014/main" id="{AE2CF462-A8A9-0EC4-364B-0E200B0CA489}"/>
+              </a:ext>
+            </a:extLst>
+          </p:cNvPr>
+          <p:cNvSpPr/>
+          <p:nvPr/>
+        </p:nvSpPr>
+        <p:spPr>
+          <a:xfrm>
+            <a:off x="9527954" y="344216"/>
+            <a:ext cx="2475202" cy="2651113"/>
+          </a:xfrm>
+          <a:prstGeom prst="rect">
+            <a:avLst/>
+          </a:prstGeom>
+          <a:noFill/>
+          <a:ln w="88900"/>
+        </p:spPr>
+        <p:style>
+          <a:lnRef idx="2">
+            <a:schemeClr val="accent1">
+              <a:shade val="15000"/>
+            </a:schemeClr>
+          </a:lnRef>
+          <a:fillRef idx="1">
+            <a:schemeClr val="accent1"/>
+          </a:fillRef>
+          <a:effectRef idx="0">
+            <a:schemeClr val="accent1"/>
+          </a:effectRef>
+          <a:fontRef idx="minor">
+            <a:schemeClr val="lt1"/>
+          </a:fontRef>
+        </p:style>
+        <p:txBody>
+          <a:bodyPr rtlCol="0" anchor="ctr"/>
+          <a:lstStyle/>
+          <a:p>
+            <a:pPr algn="ctr"/>
+            <a:endParaRPr lang="en-US"/>
+          </a:p>
+        </p:txBody>
+      </p:sp>
+      <p:sp>
+        <p:nvSpPr>
+          <p:cNvPr id="74" name="Rectangle 73">
+            <a:extLst>
+              <a:ext uri="{FF2B5EF4-FFF2-40B4-BE49-F238E27FC236}">
+                <a16:creationId xmlns:a16="http://schemas.microsoft.com/office/drawing/2014/main" id="{A287931B-AE06-C120-39CE-A6942CC34D03}"/>
+              </a:ext>
+            </a:extLst>
+          </p:cNvPr>
+          <p:cNvSpPr/>
+          <p:nvPr/>
+        </p:nvSpPr>
+        <p:spPr>
+          <a:xfrm>
+            <a:off x="9617141" y="430377"/>
+            <a:ext cx="2304288" cy="1239395"/>
+          </a:xfrm>
+          <a:prstGeom prst="rect">
+            <a:avLst/>
+          </a:prstGeom>
+          <a:noFill/>
+          <a:ln w="88900">
+            <a:solidFill>
+              <a:schemeClr val="tx1">
+                <a:lumMod val="50000"/>
+                <a:lumOff val="50000"/>
+              </a:schemeClr>
+            </a:solidFill>
+          </a:ln>
+        </p:spPr>
+        <p:style>
+          <a:lnRef idx="2">
+            <a:schemeClr val="accent1">
+              <a:shade val="15000"/>
+            </a:schemeClr>
+          </a:lnRef>
+          <a:fillRef idx="1">
+            <a:schemeClr val="accent1"/>
+          </a:fillRef>
+          <a:effectRef idx="0">
+            <a:schemeClr val="accent1"/>
+          </a:effectRef>
+          <a:fontRef idx="minor">
+            <a:schemeClr val="lt1"/>
+          </a:fontRef>
+        </p:style>
+        <p:txBody>
+          <a:bodyPr rtlCol="0" anchor="ctr"/>
+          <a:lstStyle/>
+          <a:p>
+            <a:pPr algn="ctr"/>
+            <a:endParaRPr lang="en-US" dirty="0">
+              <a:solidFill>
+                <a:schemeClr val="tx1"/>
+              </a:solidFill>
+            </a:endParaRPr>
+          </a:p>
+        </p:txBody>
+      </p:sp>
+      <p:sp>
+        <p:nvSpPr>
+          <p:cNvPr id="75" name="Rectangle 74">
+            <a:extLst>
+              <a:ext uri="{FF2B5EF4-FFF2-40B4-BE49-F238E27FC236}">
+                <a16:creationId xmlns:a16="http://schemas.microsoft.com/office/drawing/2014/main" id="{E49206BA-07BD-D4E3-62EC-845E691F5DAA}"/>
+              </a:ext>
+            </a:extLst>
+          </p:cNvPr>
+          <p:cNvSpPr/>
+          <p:nvPr/>
+        </p:nvSpPr>
+        <p:spPr>
+          <a:xfrm>
+            <a:off x="9616383" y="1669772"/>
+            <a:ext cx="2304288" cy="1239395"/>
+          </a:xfrm>
+          <a:prstGeom prst="rect">
+            <a:avLst/>
+          </a:prstGeom>
+          <a:noFill/>
+          <a:ln w="88900">
+            <a:solidFill>
+              <a:schemeClr val="tx1">
+                <a:lumMod val="50000"/>
+                <a:lumOff val="50000"/>
+              </a:schemeClr>
+            </a:solidFill>
+          </a:ln>
+        </p:spPr>
+        <p:style>
+          <a:lnRef idx="2">
+            <a:schemeClr val="accent1">
+              <a:shade val="15000"/>
+            </a:schemeClr>
+          </a:lnRef>
+          <a:fillRef idx="1">
+            <a:schemeClr val="accent1"/>
+          </a:fillRef>
+          <a:effectRef idx="0">
+            <a:schemeClr val="accent1"/>
+          </a:effectRef>
+          <a:fontRef idx="minor">
+            <a:schemeClr val="lt1"/>
+          </a:fontRef>
+        </p:style>
+        <p:txBody>
+          <a:bodyPr rtlCol="0" anchor="ctr"/>
+          <a:lstStyle/>
+          <a:p>
+            <a:pPr algn="ctr"/>
+            <a:endParaRPr lang="en-US" dirty="0">
+              <a:solidFill>
+                <a:schemeClr val="tx1"/>
+              </a:solidFill>
+            </a:endParaRPr>
+          </a:p>
+        </p:txBody>
+      </p:sp>
+      <p:sp>
+        <p:nvSpPr>
+          <p:cNvPr id="76" name="Rectangle 75">
+            <a:extLst>
+              <a:ext uri="{FF2B5EF4-FFF2-40B4-BE49-F238E27FC236}">
+                <a16:creationId xmlns:a16="http://schemas.microsoft.com/office/drawing/2014/main" id="{23206CE4-555B-1F89-BDCA-E62B05273BF7}"/>
+              </a:ext>
+            </a:extLst>
+          </p:cNvPr>
+          <p:cNvSpPr/>
+          <p:nvPr/>
+        </p:nvSpPr>
+        <p:spPr>
+          <a:xfrm>
+            <a:off x="9691111" y="516247"/>
+            <a:ext cx="1073768" cy="1074001"/>
+          </a:xfrm>
+          <a:prstGeom prst="rect">
+            <a:avLst/>
+          </a:prstGeom>
+          <a:noFill/>
+          <a:ln w="88900">
+            <a:solidFill>
+              <a:schemeClr val="accent1">
+                <a:lumMod val="40000"/>
+                <a:lumOff val="60000"/>
+              </a:schemeClr>
+            </a:solidFill>
+          </a:ln>
+        </p:spPr>
+        <p:style>
+          <a:lnRef idx="2">
+            <a:schemeClr val="accent1">
+              <a:shade val="15000"/>
+            </a:schemeClr>
+          </a:lnRef>
+          <a:fillRef idx="1">
+            <a:schemeClr val="accent1"/>
+          </a:fillRef>
+          <a:effectRef idx="0">
+            <a:schemeClr val="accent1"/>
+          </a:effectRef>
+          <a:fontRef idx="minor">
+            <a:schemeClr val="lt1"/>
+          </a:fontRef>
+        </p:style>
+        <p:txBody>
+          <a:bodyPr rtlCol="0" anchor="ctr"/>
+          <a:lstStyle/>
+          <a:p>
+            <a:endParaRPr lang="en-US" dirty="0">
+              <a:solidFill>
+                <a:schemeClr val="tx1"/>
+              </a:solidFill>
+            </a:endParaRPr>
+          </a:p>
+        </p:txBody>
+      </p:sp>
+      <p:sp>
+        <p:nvSpPr>
+          <p:cNvPr id="77" name="Rectangle 76">
+            <a:extLst>
+              <a:ext uri="{FF2B5EF4-FFF2-40B4-BE49-F238E27FC236}">
+                <a16:creationId xmlns:a16="http://schemas.microsoft.com/office/drawing/2014/main" id="{B1B55339-8BE3-CA5A-9BB6-8BAD71151D5A}"/>
+              </a:ext>
+            </a:extLst>
+          </p:cNvPr>
+          <p:cNvSpPr/>
+          <p:nvPr/>
+        </p:nvSpPr>
+        <p:spPr>
+          <a:xfrm>
+            <a:off x="10776295" y="516246"/>
+            <a:ext cx="1073768" cy="1074001"/>
+          </a:xfrm>
+          <a:prstGeom prst="rect">
+            <a:avLst/>
+          </a:prstGeom>
+          <a:noFill/>
+          <a:ln w="88900">
+            <a:solidFill>
+              <a:schemeClr val="accent1">
+                <a:lumMod val="40000"/>
+                <a:lumOff val="60000"/>
+              </a:schemeClr>
+            </a:solidFill>
+          </a:ln>
+        </p:spPr>
+        <p:style>
+          <a:lnRef idx="2">
+            <a:schemeClr val="accent1">
+              <a:shade val="15000"/>
+            </a:schemeClr>
+          </a:lnRef>
+          <a:fillRef idx="1">
+            <a:schemeClr val="accent1"/>
+          </a:fillRef>
+          <a:effectRef idx="0">
+            <a:schemeClr val="accent1"/>
+          </a:effectRef>
+          <a:fontRef idx="minor">
+            <a:schemeClr val="lt1"/>
+          </a:fontRef>
+        </p:style>
+        <p:txBody>
+          <a:bodyPr rtlCol="0" anchor="ctr"/>
+          <a:lstStyle/>
+          <a:p>
+            <a:pPr algn="r"/>
+            <a:endParaRPr lang="en-US" dirty="0">
+              <a:solidFill>
+                <a:schemeClr val="tx1"/>
+              </a:solidFill>
+            </a:endParaRPr>
+          </a:p>
+        </p:txBody>
+      </p:sp>
+      <p:sp>
+        <p:nvSpPr>
+          <p:cNvPr id="78" name="Rectangle 77">
+            <a:extLst>
+              <a:ext uri="{FF2B5EF4-FFF2-40B4-BE49-F238E27FC236}">
+                <a16:creationId xmlns:a16="http://schemas.microsoft.com/office/drawing/2014/main" id="{89B0BD43-83F8-3464-09FA-79FC700F6011}"/>
+              </a:ext>
+            </a:extLst>
+          </p:cNvPr>
+          <p:cNvSpPr/>
+          <p:nvPr/>
+        </p:nvSpPr>
+        <p:spPr>
+          <a:xfrm>
+            <a:off x="9695163" y="1749294"/>
+            <a:ext cx="1073768" cy="1074001"/>
+          </a:xfrm>
+          <a:prstGeom prst="rect">
+            <a:avLst/>
+          </a:prstGeom>
+          <a:noFill/>
+          <a:ln w="88900">
+            <a:solidFill>
+              <a:schemeClr val="accent1">
+                <a:lumMod val="40000"/>
+                <a:lumOff val="60000"/>
+              </a:schemeClr>
+            </a:solidFill>
+          </a:ln>
+        </p:spPr>
+        <p:style>
+          <a:lnRef idx="2">
+            <a:schemeClr val="accent1">
+              <a:shade val="15000"/>
+            </a:schemeClr>
+          </a:lnRef>
+          <a:fillRef idx="1">
+            <a:schemeClr val="accent1"/>
+          </a:fillRef>
+          <a:effectRef idx="0">
+            <a:schemeClr val="accent1"/>
+          </a:effectRef>
+          <a:fontRef idx="minor">
+            <a:schemeClr val="lt1"/>
+          </a:fontRef>
+        </p:style>
+        <p:txBody>
+          <a:bodyPr rtlCol="0" anchor="ctr"/>
+          <a:lstStyle/>
+          <a:p>
+            <a:endParaRPr lang="en-US" dirty="0">
+              <a:solidFill>
+                <a:schemeClr val="tx1"/>
+              </a:solidFill>
+            </a:endParaRPr>
+          </a:p>
+        </p:txBody>
+      </p:sp>
+      <p:sp>
+        <p:nvSpPr>
+          <p:cNvPr id="79" name="Rectangle 78">
+            <a:extLst>
+              <a:ext uri="{FF2B5EF4-FFF2-40B4-BE49-F238E27FC236}">
+                <a16:creationId xmlns:a16="http://schemas.microsoft.com/office/drawing/2014/main" id="{751F02F5-7C3C-E983-EF88-B5BC104A65D2}"/>
+              </a:ext>
+            </a:extLst>
+          </p:cNvPr>
+          <p:cNvSpPr/>
+          <p:nvPr/>
+        </p:nvSpPr>
+        <p:spPr>
+          <a:xfrm>
+            <a:off x="10780347" y="1749293"/>
+            <a:ext cx="1073768" cy="1074001"/>
+          </a:xfrm>
+          <a:prstGeom prst="rect">
+            <a:avLst/>
+          </a:prstGeom>
+          <a:noFill/>
+          <a:ln w="88900">
+            <a:solidFill>
+              <a:schemeClr val="accent1">
+                <a:lumMod val="40000"/>
+                <a:lumOff val="60000"/>
+              </a:schemeClr>
+            </a:solidFill>
+          </a:ln>
+        </p:spPr>
+        <p:style>
+          <a:lnRef idx="2">
+            <a:schemeClr val="accent1">
+              <a:shade val="15000"/>
+            </a:schemeClr>
+          </a:lnRef>
+          <a:fillRef idx="1">
+            <a:schemeClr val="accent1"/>
+          </a:fillRef>
+          <a:effectRef idx="0">
+            <a:schemeClr val="accent1"/>
+          </a:effectRef>
+          <a:fontRef idx="minor">
+            <a:schemeClr val="lt1"/>
+          </a:fontRef>
+        </p:style>
+        <p:txBody>
+          <a:bodyPr rtlCol="0" anchor="ctr"/>
+          <a:lstStyle/>
+          <a:p>
+            <a:pPr algn="r"/>
+            <a:endParaRPr lang="en-US" dirty="0">
+              <a:solidFill>
+                <a:schemeClr val="tx1"/>
+              </a:solidFill>
+            </a:endParaRPr>
+          </a:p>
+        </p:txBody>
+      </p:sp>
+      <p:sp>
+        <p:nvSpPr>
+          <p:cNvPr id="80" name="Rectangle 79">
+            <a:extLst>
+              <a:ext uri="{FF2B5EF4-FFF2-40B4-BE49-F238E27FC236}">
+                <a16:creationId xmlns:a16="http://schemas.microsoft.com/office/drawing/2014/main" id="{70F3C476-EDC2-4F3F-A314-87EA736724F3}"/>
+              </a:ext>
+            </a:extLst>
+          </p:cNvPr>
+          <p:cNvSpPr/>
+          <p:nvPr/>
+        </p:nvSpPr>
+        <p:spPr>
+          <a:xfrm>
+            <a:off x="10857359" y="1823223"/>
+            <a:ext cx="932688" cy="331304"/>
+          </a:xfrm>
+          <a:prstGeom prst="rect">
+            <a:avLst/>
+          </a:prstGeom>
+          <a:noFill/>
+          <a:ln w="63500">
+            <a:solidFill>
+              <a:schemeClr val="accent2"/>
+            </a:solidFill>
+          </a:ln>
+        </p:spPr>
+        <p:style>
+          <a:lnRef idx="2">
+            <a:schemeClr val="accent1">
+              <a:shade val="15000"/>
+            </a:schemeClr>
+          </a:lnRef>
+          <a:fillRef idx="1">
+            <a:schemeClr val="accent1"/>
+          </a:fillRef>
+          <a:effectRef idx="0">
+            <a:schemeClr val="accent1"/>
+          </a:effectRef>
+          <a:fontRef idx="minor">
+            <a:schemeClr val="lt1"/>
+          </a:fontRef>
+        </p:style>
+        <p:txBody>
+          <a:bodyPr rtlCol="0" anchor="ctr"/>
+          <a:lstStyle/>
+          <a:p>
+            <a:pPr algn="ctr"/>
+            <a:endParaRPr lang="en-US" sz="1500" dirty="0">
+              <a:solidFill>
+                <a:schemeClr val="tx1"/>
+              </a:solidFill>
+            </a:endParaRPr>
+          </a:p>
+        </p:txBody>
+      </p:sp>
+      <p:sp>
+        <p:nvSpPr>
+          <p:cNvPr id="81" name="Rectangle 80">
+            <a:extLst>
+              <a:ext uri="{FF2B5EF4-FFF2-40B4-BE49-F238E27FC236}">
+                <a16:creationId xmlns:a16="http://schemas.microsoft.com/office/drawing/2014/main" id="{79151C6C-B81B-FC27-E742-981961AEF7E6}"/>
+              </a:ext>
+            </a:extLst>
+          </p:cNvPr>
+          <p:cNvSpPr/>
+          <p:nvPr/>
+        </p:nvSpPr>
+        <p:spPr>
+          <a:xfrm>
+            <a:off x="10856988" y="2153477"/>
+            <a:ext cx="932688" cy="331304"/>
+          </a:xfrm>
+          <a:prstGeom prst="rect">
+            <a:avLst/>
+          </a:prstGeom>
+          <a:noFill/>
+          <a:ln w="63500">
+            <a:solidFill>
+              <a:schemeClr val="accent2"/>
+            </a:solidFill>
+          </a:ln>
+        </p:spPr>
+        <p:style>
+          <a:lnRef idx="2">
+            <a:schemeClr val="accent1">
+              <a:shade val="15000"/>
+            </a:schemeClr>
+          </a:lnRef>
+          <a:fillRef idx="1">
+            <a:schemeClr val="accent1"/>
+          </a:fillRef>
+          <a:effectRef idx="0">
+            <a:schemeClr val="accent1"/>
+          </a:effectRef>
+          <a:fontRef idx="minor">
+            <a:schemeClr val="lt1"/>
+          </a:fontRef>
+        </p:style>
+        <p:txBody>
+          <a:bodyPr rtlCol="0" anchor="ctr"/>
+          <a:lstStyle/>
+          <a:p>
+            <a:pPr algn="ctr"/>
+            <a:endParaRPr lang="en-US" sz="1500" dirty="0">
+              <a:solidFill>
+                <a:schemeClr val="tx1"/>
+              </a:solidFill>
+            </a:endParaRPr>
+          </a:p>
+        </p:txBody>
+      </p:sp>
+      <p:sp>
+        <p:nvSpPr>
+          <p:cNvPr id="82" name="Rectangle 81">
+            <a:extLst>
+              <a:ext uri="{FF2B5EF4-FFF2-40B4-BE49-F238E27FC236}">
+                <a16:creationId xmlns:a16="http://schemas.microsoft.com/office/drawing/2014/main" id="{74FECEF9-F494-CDF9-0F7C-30DD0C2F4006}"/>
+              </a:ext>
+            </a:extLst>
+          </p:cNvPr>
+          <p:cNvSpPr/>
+          <p:nvPr/>
+        </p:nvSpPr>
+        <p:spPr>
+          <a:xfrm>
+            <a:off x="10857359" y="2462465"/>
+            <a:ext cx="932688" cy="331304"/>
+          </a:xfrm>
+          <a:prstGeom prst="rect">
+            <a:avLst/>
+          </a:prstGeom>
+          <a:noFill/>
+          <a:ln w="63500">
+            <a:solidFill>
+              <a:schemeClr val="accent2"/>
+            </a:solidFill>
+          </a:ln>
+        </p:spPr>
+        <p:style>
+          <a:lnRef idx="2">
+            <a:schemeClr val="accent1">
+              <a:shade val="15000"/>
+            </a:schemeClr>
+          </a:lnRef>
+          <a:fillRef idx="1">
+            <a:schemeClr val="accent1"/>
+          </a:fillRef>
+          <a:effectRef idx="0">
+            <a:schemeClr val="accent1"/>
+          </a:effectRef>
+          <a:fontRef idx="minor">
+            <a:schemeClr val="lt1"/>
+          </a:fontRef>
+        </p:style>
+        <p:txBody>
+          <a:bodyPr rtlCol="0" anchor="ctr"/>
+          <a:lstStyle/>
+          <a:p>
+            <a:pPr algn="ctr"/>
+            <a:endParaRPr lang="en-US" sz="1500" dirty="0">
+              <a:solidFill>
+                <a:schemeClr val="tx1"/>
+              </a:solidFill>
+            </a:endParaRPr>
+          </a:p>
+        </p:txBody>
+      </p:sp>
+      <p:sp>
+        <p:nvSpPr>
+          <p:cNvPr id="83" name="Rectangle 82">
+            <a:extLst>
+              <a:ext uri="{FF2B5EF4-FFF2-40B4-BE49-F238E27FC236}">
+                <a16:creationId xmlns:a16="http://schemas.microsoft.com/office/drawing/2014/main" id="{7059AAB3-4CB3-9B5C-D324-F64E044F3374}"/>
+              </a:ext>
+            </a:extLst>
+          </p:cNvPr>
+          <p:cNvSpPr/>
+          <p:nvPr/>
+        </p:nvSpPr>
+        <p:spPr>
+          <a:xfrm>
+            <a:off x="9781103" y="1799379"/>
+            <a:ext cx="932688" cy="331304"/>
+          </a:xfrm>
+          <a:prstGeom prst="rect">
+            <a:avLst/>
+          </a:prstGeom>
+          <a:noFill/>
+          <a:ln w="63500">
+            <a:solidFill>
+              <a:schemeClr val="accent2"/>
+            </a:solidFill>
+          </a:ln>
+        </p:spPr>
+        <p:style>
+          <a:lnRef idx="2">
+            <a:schemeClr val="accent1">
+              <a:shade val="15000"/>
+            </a:schemeClr>
+          </a:lnRef>
+          <a:fillRef idx="1">
+            <a:schemeClr val="accent1"/>
+          </a:fillRef>
+          <a:effectRef idx="0">
+            <a:schemeClr val="accent1"/>
+          </a:effectRef>
+          <a:fontRef idx="minor">
+            <a:schemeClr val="lt1"/>
+          </a:fontRef>
+        </p:style>
+        <p:txBody>
+          <a:bodyPr rtlCol="0" anchor="ctr"/>
+          <a:lstStyle/>
+          <a:p>
+            <a:pPr algn="ctr"/>
+            <a:endParaRPr lang="en-US" sz="1500" dirty="0">
+              <a:solidFill>
+                <a:schemeClr val="tx1"/>
+              </a:solidFill>
+            </a:endParaRPr>
+          </a:p>
+        </p:txBody>
+      </p:sp>
+      <p:sp>
+        <p:nvSpPr>
+          <p:cNvPr id="84" name="Rectangle 83">
+            <a:extLst>
+              <a:ext uri="{FF2B5EF4-FFF2-40B4-BE49-F238E27FC236}">
+                <a16:creationId xmlns:a16="http://schemas.microsoft.com/office/drawing/2014/main" id="{EC922770-6D95-92CE-E03A-03C91748E65D}"/>
+              </a:ext>
+            </a:extLst>
+          </p:cNvPr>
+          <p:cNvSpPr/>
+          <p:nvPr/>
+        </p:nvSpPr>
+        <p:spPr>
+          <a:xfrm>
+            <a:off x="9780732" y="2129633"/>
+            <a:ext cx="932688" cy="331304"/>
+          </a:xfrm>
+          <a:prstGeom prst="rect">
+            <a:avLst/>
+          </a:prstGeom>
+          <a:noFill/>
+          <a:ln w="63500">
+            <a:solidFill>
+              <a:schemeClr val="accent2"/>
+            </a:solidFill>
+          </a:ln>
+        </p:spPr>
+        <p:style>
+          <a:lnRef idx="2">
+            <a:schemeClr val="accent1">
+              <a:shade val="15000"/>
+            </a:schemeClr>
+          </a:lnRef>
+          <a:fillRef idx="1">
+            <a:schemeClr val="accent1"/>
+          </a:fillRef>
+          <a:effectRef idx="0">
+            <a:schemeClr val="accent1"/>
+          </a:effectRef>
+          <a:fontRef idx="minor">
+            <a:schemeClr val="lt1"/>
+          </a:fontRef>
+        </p:style>
+        <p:txBody>
+          <a:bodyPr rtlCol="0" anchor="ctr"/>
+          <a:lstStyle/>
+          <a:p>
+            <a:pPr algn="ctr"/>
+            <a:endParaRPr lang="en-US" sz="1500" dirty="0">
+              <a:solidFill>
+                <a:schemeClr val="tx1"/>
+              </a:solidFill>
+            </a:endParaRPr>
+          </a:p>
+        </p:txBody>
+      </p:sp>
+      <p:sp>
+        <p:nvSpPr>
+          <p:cNvPr id="85" name="Rectangle 84">
+            <a:extLst>
+              <a:ext uri="{FF2B5EF4-FFF2-40B4-BE49-F238E27FC236}">
+                <a16:creationId xmlns:a16="http://schemas.microsoft.com/office/drawing/2014/main" id="{77864B5F-7333-D860-7B8A-225AE1E9FD6E}"/>
+              </a:ext>
+            </a:extLst>
+          </p:cNvPr>
+          <p:cNvSpPr/>
+          <p:nvPr/>
+        </p:nvSpPr>
+        <p:spPr>
+          <a:xfrm>
+            <a:off x="9781103" y="2438621"/>
+            <a:ext cx="932688" cy="331304"/>
+          </a:xfrm>
+          <a:prstGeom prst="rect">
+            <a:avLst/>
+          </a:prstGeom>
+          <a:noFill/>
+          <a:ln w="63500">
+            <a:solidFill>
+              <a:schemeClr val="accent2"/>
+            </a:solidFill>
+          </a:ln>
+        </p:spPr>
+        <p:style>
+          <a:lnRef idx="2">
+            <a:schemeClr val="accent1">
+              <a:shade val="15000"/>
+            </a:schemeClr>
+          </a:lnRef>
+          <a:fillRef idx="1">
+            <a:schemeClr val="accent1"/>
+          </a:fillRef>
+          <a:effectRef idx="0">
+            <a:schemeClr val="accent1"/>
+          </a:effectRef>
+          <a:fontRef idx="minor">
+            <a:schemeClr val="lt1"/>
+          </a:fontRef>
+        </p:style>
+        <p:txBody>
+          <a:bodyPr rtlCol="0" anchor="ctr"/>
+          <a:lstStyle/>
+          <a:p>
+            <a:pPr algn="ctr"/>
+            <a:endParaRPr lang="en-US" sz="1500" dirty="0">
+              <a:solidFill>
+                <a:schemeClr val="tx1"/>
+              </a:solidFill>
+            </a:endParaRPr>
+          </a:p>
+        </p:txBody>
+      </p:sp>
+      <p:sp>
+        <p:nvSpPr>
+          <p:cNvPr id="86" name="Rectangle 85">
+            <a:extLst>
+              <a:ext uri="{FF2B5EF4-FFF2-40B4-BE49-F238E27FC236}">
+                <a16:creationId xmlns:a16="http://schemas.microsoft.com/office/drawing/2014/main" id="{7EA2D53F-CC04-578C-96E5-C16AF23F53A0}"/>
+              </a:ext>
+            </a:extLst>
+          </p:cNvPr>
+          <p:cNvSpPr/>
+          <p:nvPr/>
+        </p:nvSpPr>
+        <p:spPr>
+          <a:xfrm>
+            <a:off x="9772241" y="585017"/>
+            <a:ext cx="932688" cy="331304"/>
+          </a:xfrm>
+          <a:prstGeom prst="rect">
+            <a:avLst/>
+          </a:prstGeom>
+          <a:noFill/>
+          <a:ln w="63500">
+            <a:solidFill>
+              <a:schemeClr val="accent2"/>
+            </a:solidFill>
+          </a:ln>
+        </p:spPr>
+        <p:style>
+          <a:lnRef idx="2">
+            <a:schemeClr val="accent1">
+              <a:shade val="15000"/>
+            </a:schemeClr>
+          </a:lnRef>
+          <a:fillRef idx="1">
+            <a:schemeClr val="accent1"/>
+          </a:fillRef>
+          <a:effectRef idx="0">
+            <a:schemeClr val="accent1"/>
+          </a:effectRef>
+          <a:fontRef idx="minor">
+            <a:schemeClr val="lt1"/>
+          </a:fontRef>
+        </p:style>
+        <p:txBody>
+          <a:bodyPr rtlCol="0" anchor="ctr"/>
+          <a:lstStyle/>
+          <a:p>
+            <a:pPr algn="ctr"/>
+            <a:endParaRPr lang="en-US" sz="1500" dirty="0">
+              <a:solidFill>
+                <a:schemeClr val="tx1"/>
+              </a:solidFill>
+            </a:endParaRPr>
+          </a:p>
+        </p:txBody>
+      </p:sp>
+      <p:sp>
+        <p:nvSpPr>
+          <p:cNvPr id="87" name="Rectangle 86">
+            <a:extLst>
+              <a:ext uri="{FF2B5EF4-FFF2-40B4-BE49-F238E27FC236}">
+                <a16:creationId xmlns:a16="http://schemas.microsoft.com/office/drawing/2014/main" id="{C0DC332F-4843-A75B-B10B-8E9005EEF3CD}"/>
+              </a:ext>
+            </a:extLst>
+          </p:cNvPr>
+          <p:cNvSpPr/>
+          <p:nvPr/>
+        </p:nvSpPr>
+        <p:spPr>
+          <a:xfrm>
+            <a:off x="9771870" y="915271"/>
+            <a:ext cx="932688" cy="331304"/>
+          </a:xfrm>
+          <a:prstGeom prst="rect">
+            <a:avLst/>
+          </a:prstGeom>
+          <a:noFill/>
+          <a:ln w="63500">
+            <a:solidFill>
+              <a:schemeClr val="accent2"/>
+            </a:solidFill>
+          </a:ln>
+        </p:spPr>
+        <p:style>
+          <a:lnRef idx="2">
+            <a:schemeClr val="accent1">
+              <a:shade val="15000"/>
+            </a:schemeClr>
+          </a:lnRef>
+          <a:fillRef idx="1">
+            <a:schemeClr val="accent1"/>
+          </a:fillRef>
+          <a:effectRef idx="0">
+            <a:schemeClr val="accent1"/>
+          </a:effectRef>
+          <a:fontRef idx="minor">
+            <a:schemeClr val="lt1"/>
+          </a:fontRef>
+        </p:style>
+        <p:txBody>
+          <a:bodyPr rtlCol="0" anchor="ctr"/>
+          <a:lstStyle/>
+          <a:p>
+            <a:pPr algn="ctr"/>
+            <a:endParaRPr lang="en-US" sz="1500" dirty="0">
+              <a:solidFill>
+                <a:schemeClr val="tx1"/>
+              </a:solidFill>
+            </a:endParaRPr>
+          </a:p>
+        </p:txBody>
+      </p:sp>
+      <p:sp>
+        <p:nvSpPr>
+          <p:cNvPr id="88" name="Rectangle 87">
+            <a:extLst>
+              <a:ext uri="{FF2B5EF4-FFF2-40B4-BE49-F238E27FC236}">
+                <a16:creationId xmlns:a16="http://schemas.microsoft.com/office/drawing/2014/main" id="{CA01D4B2-8DD3-1678-92CC-39876291F827}"/>
+              </a:ext>
+            </a:extLst>
+          </p:cNvPr>
+          <p:cNvSpPr/>
+          <p:nvPr/>
+        </p:nvSpPr>
+        <p:spPr>
+          <a:xfrm>
+            <a:off x="9772241" y="1224259"/>
+            <a:ext cx="932688" cy="331304"/>
+          </a:xfrm>
+          <a:prstGeom prst="rect">
+            <a:avLst/>
+          </a:prstGeom>
+          <a:noFill/>
+          <a:ln w="63500">
+            <a:solidFill>
+              <a:schemeClr val="accent2"/>
+            </a:solidFill>
+          </a:ln>
+        </p:spPr>
+        <p:style>
+          <a:lnRef idx="2">
+            <a:schemeClr val="accent1">
+              <a:shade val="15000"/>
+            </a:schemeClr>
+          </a:lnRef>
+          <a:fillRef idx="1">
+            <a:schemeClr val="accent1"/>
+          </a:fillRef>
+          <a:effectRef idx="0">
+            <a:schemeClr val="accent1"/>
+          </a:effectRef>
+          <a:fontRef idx="minor">
+            <a:schemeClr val="lt1"/>
+          </a:fontRef>
+        </p:style>
+        <p:txBody>
+          <a:bodyPr rtlCol="0" anchor="ctr"/>
+          <a:lstStyle/>
+          <a:p>
+            <a:pPr algn="ctr"/>
+            <a:endParaRPr lang="en-US" sz="1500" dirty="0">
+              <a:solidFill>
+                <a:schemeClr val="tx1"/>
+              </a:solidFill>
+            </a:endParaRPr>
+          </a:p>
+        </p:txBody>
+      </p:sp>
+      <p:sp>
+        <p:nvSpPr>
+          <p:cNvPr id="89" name="Rectangle 88">
+            <a:extLst>
+              <a:ext uri="{FF2B5EF4-FFF2-40B4-BE49-F238E27FC236}">
+                <a16:creationId xmlns:a16="http://schemas.microsoft.com/office/drawing/2014/main" id="{90FAAE86-EF48-4814-B375-4286C2A23EE3}"/>
+              </a:ext>
+            </a:extLst>
+          </p:cNvPr>
+          <p:cNvSpPr/>
+          <p:nvPr/>
+        </p:nvSpPr>
+        <p:spPr>
+          <a:xfrm>
+            <a:off x="10845638" y="585016"/>
+            <a:ext cx="932688" cy="331304"/>
+          </a:xfrm>
+          <a:prstGeom prst="rect">
+            <a:avLst/>
+          </a:prstGeom>
+          <a:noFill/>
+          <a:ln w="63500">
+            <a:solidFill>
+              <a:schemeClr val="accent2"/>
+            </a:solidFill>
+          </a:ln>
+        </p:spPr>
+        <p:style>
+          <a:lnRef idx="2">
+            <a:schemeClr val="accent1">
+              <a:shade val="15000"/>
+            </a:schemeClr>
+          </a:lnRef>
+          <a:fillRef idx="1">
+            <a:schemeClr val="accent1"/>
+          </a:fillRef>
+          <a:effectRef idx="0">
+            <a:schemeClr val="accent1"/>
+          </a:effectRef>
+          <a:fontRef idx="minor">
+            <a:schemeClr val="lt1"/>
+          </a:fontRef>
+        </p:style>
+        <p:txBody>
+          <a:bodyPr rtlCol="0" anchor="ctr"/>
+          <a:lstStyle/>
+          <a:p>
+            <a:pPr algn="ctr"/>
+            <a:endParaRPr lang="en-US" sz="1500" dirty="0">
+              <a:solidFill>
+                <a:schemeClr val="tx1"/>
+              </a:solidFill>
+            </a:endParaRPr>
+          </a:p>
+        </p:txBody>
+      </p:sp>
+      <p:sp>
+        <p:nvSpPr>
+          <p:cNvPr id="90" name="Rectangle 89">
+            <a:extLst>
+              <a:ext uri="{FF2B5EF4-FFF2-40B4-BE49-F238E27FC236}">
+                <a16:creationId xmlns:a16="http://schemas.microsoft.com/office/drawing/2014/main" id="{D0F1A408-C96C-A9E7-4785-4181049A3E79}"/>
+              </a:ext>
+            </a:extLst>
+          </p:cNvPr>
+          <p:cNvSpPr/>
+          <p:nvPr/>
+        </p:nvSpPr>
+        <p:spPr>
+          <a:xfrm>
+            <a:off x="10845267" y="915270"/>
+            <a:ext cx="932688" cy="331304"/>
+          </a:xfrm>
+          <a:prstGeom prst="rect">
+            <a:avLst/>
+          </a:prstGeom>
+          <a:noFill/>
+          <a:ln w="63500">
+            <a:solidFill>
+              <a:schemeClr val="accent2"/>
+            </a:solidFill>
+          </a:ln>
+        </p:spPr>
+        <p:style>
+          <a:lnRef idx="2">
+            <a:schemeClr val="accent1">
+              <a:shade val="15000"/>
+            </a:schemeClr>
+          </a:lnRef>
+          <a:fillRef idx="1">
+            <a:schemeClr val="accent1"/>
+          </a:fillRef>
+          <a:effectRef idx="0">
+            <a:schemeClr val="accent1"/>
+          </a:effectRef>
+          <a:fontRef idx="minor">
+            <a:schemeClr val="lt1"/>
+          </a:fontRef>
+        </p:style>
+        <p:txBody>
+          <a:bodyPr rtlCol="0" anchor="ctr"/>
+          <a:lstStyle/>
+          <a:p>
+            <a:pPr algn="ctr"/>
+            <a:endParaRPr lang="en-US" sz="1500" dirty="0">
+              <a:solidFill>
+                <a:schemeClr val="tx1"/>
+              </a:solidFill>
+            </a:endParaRPr>
+          </a:p>
+        </p:txBody>
+      </p:sp>
+      <p:sp>
+        <p:nvSpPr>
+          <p:cNvPr id="91" name="Rectangle 90">
+            <a:extLst>
+              <a:ext uri="{FF2B5EF4-FFF2-40B4-BE49-F238E27FC236}">
+                <a16:creationId xmlns:a16="http://schemas.microsoft.com/office/drawing/2014/main" id="{2BF401F1-B0D8-CD5B-2D9C-F3ACCFE6676D}"/>
+              </a:ext>
+            </a:extLst>
+          </p:cNvPr>
+          <p:cNvSpPr/>
+          <p:nvPr/>
+        </p:nvSpPr>
+        <p:spPr>
+          <a:xfrm>
+            <a:off x="10845638" y="1224258"/>
+            <a:ext cx="932688" cy="331304"/>
+          </a:xfrm>
+          <a:prstGeom prst="rect">
+            <a:avLst/>
+          </a:prstGeom>
+          <a:noFill/>
+          <a:ln w="63500">
+            <a:solidFill>
+              <a:schemeClr val="accent2"/>
+            </a:solidFill>
+          </a:ln>
+        </p:spPr>
+        <p:style>
+          <a:lnRef idx="2">
+            <a:schemeClr val="accent1">
+              <a:shade val="15000"/>
+            </a:schemeClr>
+          </a:lnRef>
+          <a:fillRef idx="1">
+            <a:schemeClr val="accent1"/>
+          </a:fillRef>
+          <a:effectRef idx="0">
+            <a:schemeClr val="accent1"/>
+          </a:effectRef>
+          <a:fontRef idx="minor">
+            <a:schemeClr val="lt1"/>
+          </a:fontRef>
+        </p:style>
+        <p:txBody>
+          <a:bodyPr rtlCol="0" anchor="ctr"/>
+          <a:lstStyle/>
+          <a:p>
+            <a:pPr algn="ctr"/>
+            <a:endParaRPr lang="en-US" sz="1500" dirty="0">
+              <a:solidFill>
+                <a:schemeClr val="tx1"/>
+              </a:solidFill>
+            </a:endParaRPr>
+          </a:p>
+        </p:txBody>
+      </p:sp>
+      <p:sp>
+        <p:nvSpPr>
+          <p:cNvPr id="92" name="Rectangle 91">
+            <a:extLst>
+              <a:ext uri="{FF2B5EF4-FFF2-40B4-BE49-F238E27FC236}">
+                <a16:creationId xmlns:a16="http://schemas.microsoft.com/office/drawing/2014/main" id="{B98E8CB1-3B83-7051-F020-15A64A324258}"/>
+              </a:ext>
+            </a:extLst>
+          </p:cNvPr>
+          <p:cNvSpPr/>
+          <p:nvPr/>
+        </p:nvSpPr>
+        <p:spPr>
+          <a:xfrm>
+            <a:off x="9817124" y="635102"/>
+            <a:ext cx="388596" cy="226799"/>
+          </a:xfrm>
+          <a:prstGeom prst="rect">
+            <a:avLst/>
+          </a:prstGeom>
+          <a:noFill/>
+          <a:ln w="63500">
+            <a:solidFill>
+              <a:schemeClr val="accent6">
+                <a:lumMod val="60000"/>
+                <a:lumOff val="40000"/>
+              </a:schemeClr>
+            </a:solidFill>
+          </a:ln>
+        </p:spPr>
+        <p:style>
+          <a:lnRef idx="2">
+            <a:schemeClr val="accent1">
+              <a:shade val="15000"/>
+            </a:schemeClr>
+          </a:lnRef>
+          <a:fillRef idx="1">
+            <a:schemeClr val="accent1"/>
+          </a:fillRef>
+          <a:effectRef idx="0">
+            <a:schemeClr val="accent1"/>
+          </a:effectRef>
+          <a:fontRef idx="minor">
+            <a:schemeClr val="lt1"/>
+          </a:fontRef>
+        </p:style>
+        <p:txBody>
+          <a:bodyPr rtlCol="0" anchor="ctr"/>
+          <a:lstStyle/>
+          <a:p>
+            <a:pPr algn="ctr"/>
+            <a:r>
+              <a:rPr lang="en-US" sz="1200" dirty="0">
+                <a:solidFill>
+                  <a:schemeClr val="tx1"/>
+                </a:solidFill>
+              </a:rPr>
+              <a:t>P -</a:t>
+            </a:r>
+          </a:p>
+        </p:txBody>
+      </p:sp>
+      <p:sp>
+        <p:nvSpPr>
+          <p:cNvPr id="93" name="Rectangle 92">
+            <a:extLst>
+              <a:ext uri="{FF2B5EF4-FFF2-40B4-BE49-F238E27FC236}">
+                <a16:creationId xmlns:a16="http://schemas.microsoft.com/office/drawing/2014/main" id="{A841506B-F854-0ACF-D7E3-2DAB41E3A3F6}"/>
+              </a:ext>
+            </a:extLst>
+          </p:cNvPr>
+          <p:cNvSpPr/>
+          <p:nvPr/>
+        </p:nvSpPr>
+        <p:spPr>
+          <a:xfrm>
+            <a:off x="10261026" y="635102"/>
+            <a:ext cx="388596" cy="226799"/>
+          </a:xfrm>
+          <a:prstGeom prst="rect">
+            <a:avLst/>
+          </a:prstGeom>
+          <a:noFill/>
+          <a:ln w="63500">
+            <a:solidFill>
+              <a:schemeClr val="accent6">
+                <a:lumMod val="60000"/>
+                <a:lumOff val="40000"/>
+              </a:schemeClr>
+            </a:solidFill>
+          </a:ln>
+        </p:spPr>
+        <p:style>
+          <a:lnRef idx="2">
+            <a:schemeClr val="accent1">
+              <a:shade val="15000"/>
+            </a:schemeClr>
+          </a:lnRef>
+          <a:fillRef idx="1">
+            <a:schemeClr val="accent1"/>
+          </a:fillRef>
+          <a:effectRef idx="0">
+            <a:schemeClr val="accent1"/>
+          </a:effectRef>
+          <a:fontRef idx="minor">
+            <a:schemeClr val="lt1"/>
+          </a:fontRef>
+        </p:style>
+        <p:txBody>
+          <a:bodyPr rtlCol="0" anchor="ctr"/>
+          <a:lstStyle/>
+          <a:p>
+            <a:pPr algn="ctr"/>
+            <a:r>
+              <a:rPr lang="en-US" sz="1200" dirty="0">
+                <a:solidFill>
+                  <a:schemeClr val="tx1"/>
+                </a:solidFill>
+              </a:rPr>
+              <a:t>P +</a:t>
+            </a:r>
+          </a:p>
+        </p:txBody>
+      </p:sp>
+      <p:sp>
+        <p:nvSpPr>
+          <p:cNvPr id="94" name="Rectangle 93">
+            <a:extLst>
+              <a:ext uri="{FF2B5EF4-FFF2-40B4-BE49-F238E27FC236}">
+                <a16:creationId xmlns:a16="http://schemas.microsoft.com/office/drawing/2014/main" id="{4ECE2C3A-D0E6-6676-6489-BD5BBA196FCE}"/>
+              </a:ext>
+            </a:extLst>
+          </p:cNvPr>
+          <p:cNvSpPr/>
+          <p:nvPr/>
+        </p:nvSpPr>
+        <p:spPr>
+          <a:xfrm>
+            <a:off x="9817124" y="957968"/>
+            <a:ext cx="388596" cy="226799"/>
+          </a:xfrm>
+          <a:prstGeom prst="rect">
+            <a:avLst/>
+          </a:prstGeom>
+          <a:noFill/>
+          <a:ln w="63500">
+            <a:solidFill>
+              <a:schemeClr val="accent6">
+                <a:lumMod val="60000"/>
+                <a:lumOff val="40000"/>
+              </a:schemeClr>
+            </a:solidFill>
+          </a:ln>
+        </p:spPr>
+        <p:style>
+          <a:lnRef idx="2">
+            <a:schemeClr val="accent1">
+              <a:shade val="15000"/>
+            </a:schemeClr>
+          </a:lnRef>
+          <a:fillRef idx="1">
+            <a:schemeClr val="accent1"/>
+          </a:fillRef>
+          <a:effectRef idx="0">
+            <a:schemeClr val="accent1"/>
+          </a:effectRef>
+          <a:fontRef idx="minor">
+            <a:schemeClr val="lt1"/>
+          </a:fontRef>
+        </p:style>
+        <p:txBody>
+          <a:bodyPr rtlCol="0" anchor="ctr"/>
+          <a:lstStyle/>
+          <a:p>
+            <a:pPr algn="ctr"/>
+            <a:endParaRPr lang="en-US" sz="1500" dirty="0">
+              <a:solidFill>
+                <a:schemeClr val="tx1"/>
+              </a:solidFill>
+            </a:endParaRPr>
+          </a:p>
+        </p:txBody>
+      </p:sp>
+      <p:sp>
+        <p:nvSpPr>
+          <p:cNvPr id="95" name="Rectangle 94">
+            <a:extLst>
+              <a:ext uri="{FF2B5EF4-FFF2-40B4-BE49-F238E27FC236}">
+                <a16:creationId xmlns:a16="http://schemas.microsoft.com/office/drawing/2014/main" id="{D168FF9C-72FA-6080-FE74-4B4D0027BEFE}"/>
+              </a:ext>
+            </a:extLst>
+          </p:cNvPr>
+          <p:cNvSpPr/>
+          <p:nvPr/>
+        </p:nvSpPr>
+        <p:spPr>
+          <a:xfrm>
+            <a:off x="10261026" y="957968"/>
+            <a:ext cx="388596" cy="226799"/>
+          </a:xfrm>
+          <a:prstGeom prst="rect">
+            <a:avLst/>
+          </a:prstGeom>
+          <a:noFill/>
+          <a:ln w="63500">
+            <a:solidFill>
+              <a:schemeClr val="accent6">
+                <a:lumMod val="60000"/>
+                <a:lumOff val="40000"/>
+              </a:schemeClr>
+            </a:solidFill>
+          </a:ln>
+        </p:spPr>
+        <p:style>
+          <a:lnRef idx="2">
+            <a:schemeClr val="accent1">
+              <a:shade val="15000"/>
+            </a:schemeClr>
+          </a:lnRef>
+          <a:fillRef idx="1">
+            <a:schemeClr val="accent1"/>
+          </a:fillRef>
+          <a:effectRef idx="0">
+            <a:schemeClr val="accent1"/>
+          </a:effectRef>
+          <a:fontRef idx="minor">
+            <a:schemeClr val="lt1"/>
+          </a:fontRef>
+        </p:style>
+        <p:txBody>
+          <a:bodyPr rtlCol="0" anchor="ctr"/>
+          <a:lstStyle/>
+          <a:p>
+            <a:pPr algn="ctr"/>
+            <a:endParaRPr lang="en-US" sz="1500" dirty="0">
+              <a:solidFill>
+                <a:schemeClr val="tx1"/>
+              </a:solidFill>
+            </a:endParaRPr>
+          </a:p>
+        </p:txBody>
+      </p:sp>
+      <p:sp>
+        <p:nvSpPr>
+          <p:cNvPr id="96" name="Rectangle 95">
+            <a:extLst>
+              <a:ext uri="{FF2B5EF4-FFF2-40B4-BE49-F238E27FC236}">
+                <a16:creationId xmlns:a16="http://schemas.microsoft.com/office/drawing/2014/main" id="{3EB604EC-975B-468B-1E7C-8C21103C306D}"/>
+              </a:ext>
+            </a:extLst>
+          </p:cNvPr>
+          <p:cNvSpPr/>
+          <p:nvPr/>
+        </p:nvSpPr>
+        <p:spPr>
+          <a:xfrm>
+            <a:off x="9817124" y="1288222"/>
+            <a:ext cx="388596" cy="226799"/>
+          </a:xfrm>
+          <a:prstGeom prst="rect">
+            <a:avLst/>
+          </a:prstGeom>
+          <a:noFill/>
+          <a:ln w="63500">
+            <a:solidFill>
+              <a:schemeClr val="accent6">
+                <a:lumMod val="60000"/>
+                <a:lumOff val="40000"/>
+              </a:schemeClr>
+            </a:solidFill>
+          </a:ln>
+        </p:spPr>
+        <p:style>
+          <a:lnRef idx="2">
+            <a:schemeClr val="accent1">
+              <a:shade val="15000"/>
+            </a:schemeClr>
+          </a:lnRef>
+          <a:fillRef idx="1">
+            <a:schemeClr val="accent1"/>
+          </a:fillRef>
+          <a:effectRef idx="0">
+            <a:schemeClr val="accent1"/>
+          </a:effectRef>
+          <a:fontRef idx="minor">
+            <a:schemeClr val="lt1"/>
+          </a:fontRef>
+        </p:style>
+        <p:txBody>
+          <a:bodyPr rtlCol="0" anchor="ctr"/>
+          <a:lstStyle/>
+          <a:p>
+            <a:pPr algn="ctr"/>
+            <a:endParaRPr lang="en-US" sz="1500" dirty="0">
+              <a:solidFill>
+                <a:schemeClr val="tx1"/>
+              </a:solidFill>
+            </a:endParaRPr>
+          </a:p>
+        </p:txBody>
+      </p:sp>
+      <p:sp>
+        <p:nvSpPr>
+          <p:cNvPr id="97" name="Rectangle 96">
+            <a:extLst>
+              <a:ext uri="{FF2B5EF4-FFF2-40B4-BE49-F238E27FC236}">
+                <a16:creationId xmlns:a16="http://schemas.microsoft.com/office/drawing/2014/main" id="{AA446250-2022-B9DA-51CB-E1BDC0BD47B5}"/>
+              </a:ext>
+            </a:extLst>
+          </p:cNvPr>
+          <p:cNvSpPr/>
+          <p:nvPr/>
+        </p:nvSpPr>
+        <p:spPr>
+          <a:xfrm>
+            <a:off x="10261026" y="1288222"/>
+            <a:ext cx="388596" cy="226799"/>
+          </a:xfrm>
+          <a:prstGeom prst="rect">
+            <a:avLst/>
+          </a:prstGeom>
+          <a:noFill/>
+          <a:ln w="63500">
+            <a:solidFill>
+              <a:schemeClr val="accent6">
+                <a:lumMod val="60000"/>
+                <a:lumOff val="40000"/>
+              </a:schemeClr>
+            </a:solidFill>
+          </a:ln>
+        </p:spPr>
+        <p:style>
+          <a:lnRef idx="2">
+            <a:schemeClr val="accent1">
+              <a:shade val="15000"/>
+            </a:schemeClr>
+          </a:lnRef>
+          <a:fillRef idx="1">
+            <a:schemeClr val="accent1"/>
+          </a:fillRef>
+          <a:effectRef idx="0">
+            <a:schemeClr val="accent1"/>
+          </a:effectRef>
+          <a:fontRef idx="minor">
+            <a:schemeClr val="lt1"/>
+          </a:fontRef>
+        </p:style>
+        <p:txBody>
+          <a:bodyPr rtlCol="0" anchor="ctr"/>
+          <a:lstStyle/>
+          <a:p>
+            <a:pPr algn="ctr"/>
+            <a:endParaRPr lang="en-US" sz="1500" dirty="0">
+              <a:solidFill>
+                <a:schemeClr val="tx1"/>
+              </a:solidFill>
+            </a:endParaRPr>
+          </a:p>
+        </p:txBody>
+      </p:sp>
+      <p:sp>
+        <p:nvSpPr>
+          <p:cNvPr id="98" name="Rectangle 97">
+            <a:extLst>
+              <a:ext uri="{FF2B5EF4-FFF2-40B4-BE49-F238E27FC236}">
+                <a16:creationId xmlns:a16="http://schemas.microsoft.com/office/drawing/2014/main" id="{8FB90201-7A17-D7E6-3B11-B95D482D229F}"/>
+              </a:ext>
+            </a:extLst>
+          </p:cNvPr>
+          <p:cNvSpPr/>
+          <p:nvPr/>
+        </p:nvSpPr>
+        <p:spPr>
+          <a:xfrm>
+            <a:off x="9817124" y="1841997"/>
+            <a:ext cx="388596" cy="226799"/>
+          </a:xfrm>
+          <a:prstGeom prst="rect">
+            <a:avLst/>
+          </a:prstGeom>
+          <a:noFill/>
+          <a:ln w="63500">
+            <a:solidFill>
+              <a:schemeClr val="accent6">
+                <a:lumMod val="60000"/>
+                <a:lumOff val="40000"/>
+              </a:schemeClr>
+            </a:solidFill>
+          </a:ln>
+        </p:spPr>
+        <p:style>
+          <a:lnRef idx="2">
+            <a:schemeClr val="accent1">
+              <a:shade val="15000"/>
+            </a:schemeClr>
+          </a:lnRef>
+          <a:fillRef idx="1">
+            <a:schemeClr val="accent1"/>
+          </a:fillRef>
+          <a:effectRef idx="0">
+            <a:schemeClr val="accent1"/>
+          </a:effectRef>
+          <a:fontRef idx="minor">
+            <a:schemeClr val="lt1"/>
+          </a:fontRef>
+        </p:style>
+        <p:txBody>
+          <a:bodyPr rtlCol="0" anchor="ctr"/>
+          <a:lstStyle/>
+          <a:p>
+            <a:pPr algn="ctr"/>
+            <a:endParaRPr lang="en-US" sz="1500" dirty="0">
+              <a:solidFill>
+                <a:schemeClr val="tx1"/>
+              </a:solidFill>
+            </a:endParaRPr>
+          </a:p>
+        </p:txBody>
+      </p:sp>
+      <p:sp>
+        <p:nvSpPr>
+          <p:cNvPr id="99" name="Rectangle 98">
+            <a:extLst>
+              <a:ext uri="{FF2B5EF4-FFF2-40B4-BE49-F238E27FC236}">
+                <a16:creationId xmlns:a16="http://schemas.microsoft.com/office/drawing/2014/main" id="{9059C8FD-2201-2C93-9045-56CE9322AD19}"/>
+              </a:ext>
+            </a:extLst>
+          </p:cNvPr>
+          <p:cNvSpPr/>
+          <p:nvPr/>
+        </p:nvSpPr>
+        <p:spPr>
+          <a:xfrm>
+            <a:off x="10261026" y="1841997"/>
+            <a:ext cx="388596" cy="226799"/>
+          </a:xfrm>
+          <a:prstGeom prst="rect">
+            <a:avLst/>
+          </a:prstGeom>
+          <a:noFill/>
+          <a:ln w="63500">
+            <a:solidFill>
+              <a:schemeClr val="accent6">
+                <a:lumMod val="60000"/>
+                <a:lumOff val="40000"/>
+              </a:schemeClr>
+            </a:solidFill>
+          </a:ln>
+        </p:spPr>
+        <p:style>
+          <a:lnRef idx="2">
+            <a:schemeClr val="accent1">
+              <a:shade val="15000"/>
+            </a:schemeClr>
+          </a:lnRef>
+          <a:fillRef idx="1">
+            <a:schemeClr val="accent1"/>
+          </a:fillRef>
+          <a:effectRef idx="0">
+            <a:schemeClr val="accent1"/>
+          </a:effectRef>
+          <a:fontRef idx="minor">
+            <a:schemeClr val="lt1"/>
+          </a:fontRef>
+        </p:style>
+        <p:txBody>
+          <a:bodyPr rtlCol="0" anchor="ctr"/>
+          <a:lstStyle/>
+          <a:p>
+            <a:pPr algn="ctr"/>
+            <a:endParaRPr lang="en-US" sz="1500" dirty="0">
+              <a:solidFill>
+                <a:schemeClr val="tx1"/>
+              </a:solidFill>
+            </a:endParaRPr>
+          </a:p>
+        </p:txBody>
+      </p:sp>
+      <p:sp>
+        <p:nvSpPr>
+          <p:cNvPr id="100" name="Rectangle 99">
+            <a:extLst>
+              <a:ext uri="{FF2B5EF4-FFF2-40B4-BE49-F238E27FC236}">
+                <a16:creationId xmlns:a16="http://schemas.microsoft.com/office/drawing/2014/main" id="{8F725A8F-8912-8B70-E7A3-E09FE78C3AC2}"/>
+              </a:ext>
+            </a:extLst>
+          </p:cNvPr>
+          <p:cNvSpPr/>
+          <p:nvPr/>
+        </p:nvSpPr>
+        <p:spPr>
+          <a:xfrm>
+            <a:off x="9817124" y="2165363"/>
+            <a:ext cx="388596" cy="226799"/>
+          </a:xfrm>
+          <a:prstGeom prst="rect">
+            <a:avLst/>
+          </a:prstGeom>
+          <a:noFill/>
+          <a:ln w="63500">
+            <a:solidFill>
+              <a:schemeClr val="accent6">
+                <a:lumMod val="60000"/>
+                <a:lumOff val="40000"/>
+              </a:schemeClr>
+            </a:solidFill>
+          </a:ln>
+        </p:spPr>
+        <p:style>
+          <a:lnRef idx="2">
+            <a:schemeClr val="accent1">
+              <a:shade val="15000"/>
+            </a:schemeClr>
+          </a:lnRef>
+          <a:fillRef idx="1">
+            <a:schemeClr val="accent1"/>
+          </a:fillRef>
+          <a:effectRef idx="0">
+            <a:schemeClr val="accent1"/>
+          </a:effectRef>
+          <a:fontRef idx="minor">
+            <a:schemeClr val="lt1"/>
+          </a:fontRef>
+        </p:style>
+        <p:txBody>
+          <a:bodyPr rtlCol="0" anchor="ctr"/>
+          <a:lstStyle/>
+          <a:p>
+            <a:pPr algn="ctr"/>
+            <a:endParaRPr lang="en-US" sz="1500" dirty="0">
+              <a:solidFill>
+                <a:schemeClr val="tx1"/>
+              </a:solidFill>
+            </a:endParaRPr>
+          </a:p>
+        </p:txBody>
+      </p:sp>
+      <p:sp>
+        <p:nvSpPr>
+          <p:cNvPr id="101" name="Rectangle 100">
+            <a:extLst>
+              <a:ext uri="{FF2B5EF4-FFF2-40B4-BE49-F238E27FC236}">
+                <a16:creationId xmlns:a16="http://schemas.microsoft.com/office/drawing/2014/main" id="{4FEA5DC8-8B31-8B0B-B2A0-007146A01AFB}"/>
+              </a:ext>
+            </a:extLst>
+          </p:cNvPr>
+          <p:cNvSpPr/>
+          <p:nvPr/>
+        </p:nvSpPr>
+        <p:spPr>
+          <a:xfrm>
+            <a:off x="10261026" y="2165363"/>
+            <a:ext cx="388596" cy="226799"/>
+          </a:xfrm>
+          <a:prstGeom prst="rect">
+            <a:avLst/>
+          </a:prstGeom>
+          <a:noFill/>
+          <a:ln w="63500">
+            <a:solidFill>
+              <a:schemeClr val="accent6">
+                <a:lumMod val="60000"/>
+                <a:lumOff val="40000"/>
+              </a:schemeClr>
+            </a:solidFill>
+          </a:ln>
+        </p:spPr>
+        <p:style>
+          <a:lnRef idx="2">
+            <a:schemeClr val="accent1">
+              <a:shade val="15000"/>
+            </a:schemeClr>
+          </a:lnRef>
+          <a:fillRef idx="1">
+            <a:schemeClr val="accent1"/>
+          </a:fillRef>
+          <a:effectRef idx="0">
+            <a:schemeClr val="accent1"/>
+          </a:effectRef>
+          <a:fontRef idx="minor">
+            <a:schemeClr val="lt1"/>
+          </a:fontRef>
+        </p:style>
+        <p:txBody>
+          <a:bodyPr rtlCol="0" anchor="ctr"/>
+          <a:lstStyle/>
+          <a:p>
+            <a:pPr algn="ctr"/>
+            <a:endParaRPr lang="en-US" sz="1500" dirty="0">
+              <a:solidFill>
+                <a:schemeClr val="tx1"/>
+              </a:solidFill>
+            </a:endParaRPr>
+          </a:p>
+        </p:txBody>
+      </p:sp>
+      <p:sp>
+        <p:nvSpPr>
+          <p:cNvPr id="102" name="Rectangle 101">
+            <a:extLst>
+              <a:ext uri="{FF2B5EF4-FFF2-40B4-BE49-F238E27FC236}">
+                <a16:creationId xmlns:a16="http://schemas.microsoft.com/office/drawing/2014/main" id="{7901C6BE-A30D-5643-A606-3E8ADA16CC00}"/>
+              </a:ext>
+            </a:extLst>
+          </p:cNvPr>
+          <p:cNvSpPr/>
+          <p:nvPr/>
+        </p:nvSpPr>
+        <p:spPr>
+          <a:xfrm>
+            <a:off x="9823036" y="2510323"/>
+            <a:ext cx="388596" cy="226799"/>
+          </a:xfrm>
+          <a:prstGeom prst="rect">
+            <a:avLst/>
+          </a:prstGeom>
+          <a:noFill/>
+          <a:ln w="63500">
+            <a:solidFill>
+              <a:schemeClr val="accent6">
+                <a:lumMod val="60000"/>
+                <a:lumOff val="40000"/>
+              </a:schemeClr>
+            </a:solidFill>
+          </a:ln>
+        </p:spPr>
+        <p:style>
+          <a:lnRef idx="2">
+            <a:schemeClr val="accent1">
+              <a:shade val="15000"/>
+            </a:schemeClr>
+          </a:lnRef>
+          <a:fillRef idx="1">
+            <a:schemeClr val="accent1"/>
+          </a:fillRef>
+          <a:effectRef idx="0">
+            <a:schemeClr val="accent1"/>
+          </a:effectRef>
+          <a:fontRef idx="minor">
+            <a:schemeClr val="lt1"/>
+          </a:fontRef>
+        </p:style>
+        <p:txBody>
+          <a:bodyPr rtlCol="0" anchor="ctr"/>
+          <a:lstStyle/>
+          <a:p>
+            <a:pPr algn="ctr"/>
+            <a:endParaRPr lang="en-US" sz="1500" dirty="0">
+              <a:solidFill>
+                <a:schemeClr val="tx1"/>
+              </a:solidFill>
+            </a:endParaRPr>
+          </a:p>
+        </p:txBody>
+      </p:sp>
+      <p:sp>
+        <p:nvSpPr>
+          <p:cNvPr id="103" name="Rectangle 102">
+            <a:extLst>
+              <a:ext uri="{FF2B5EF4-FFF2-40B4-BE49-F238E27FC236}">
+                <a16:creationId xmlns:a16="http://schemas.microsoft.com/office/drawing/2014/main" id="{6DC9999C-9139-3970-2ABF-6C955EF83C42}"/>
+              </a:ext>
+            </a:extLst>
+          </p:cNvPr>
+          <p:cNvSpPr/>
+          <p:nvPr/>
+        </p:nvSpPr>
+        <p:spPr>
+          <a:xfrm>
+            <a:off x="10266938" y="2510323"/>
+            <a:ext cx="388596" cy="226799"/>
+          </a:xfrm>
+          <a:prstGeom prst="rect">
+            <a:avLst/>
+          </a:prstGeom>
+          <a:noFill/>
+          <a:ln w="63500">
+            <a:solidFill>
+              <a:schemeClr val="accent6">
+                <a:lumMod val="60000"/>
+                <a:lumOff val="40000"/>
+              </a:schemeClr>
+            </a:solidFill>
+          </a:ln>
+        </p:spPr>
+        <p:style>
+          <a:lnRef idx="2">
+            <a:schemeClr val="accent1">
+              <a:shade val="15000"/>
+            </a:schemeClr>
+          </a:lnRef>
+          <a:fillRef idx="1">
+            <a:schemeClr val="accent1"/>
+          </a:fillRef>
+          <a:effectRef idx="0">
+            <a:schemeClr val="accent1"/>
+          </a:effectRef>
+          <a:fontRef idx="minor">
+            <a:schemeClr val="lt1"/>
+          </a:fontRef>
+        </p:style>
+        <p:txBody>
+          <a:bodyPr rtlCol="0" anchor="ctr"/>
+          <a:lstStyle/>
+          <a:p>
+            <a:pPr algn="ctr"/>
+            <a:endParaRPr lang="en-US" sz="1500" dirty="0">
+              <a:solidFill>
+                <a:schemeClr val="tx1"/>
+              </a:solidFill>
+            </a:endParaRPr>
+          </a:p>
+        </p:txBody>
+      </p:sp>
+      <p:sp>
+        <p:nvSpPr>
+          <p:cNvPr id="104" name="Rectangle 103">
+            <a:extLst>
+              <a:ext uri="{FF2B5EF4-FFF2-40B4-BE49-F238E27FC236}">
+                <a16:creationId xmlns:a16="http://schemas.microsoft.com/office/drawing/2014/main" id="{C839620C-66F3-EB51-7195-F9A4F4FF069C}"/>
+              </a:ext>
+            </a:extLst>
+          </p:cNvPr>
+          <p:cNvSpPr/>
+          <p:nvPr/>
+        </p:nvSpPr>
+        <p:spPr>
+          <a:xfrm>
+            <a:off x="10895959" y="635033"/>
+            <a:ext cx="388596" cy="226799"/>
+          </a:xfrm>
+          <a:prstGeom prst="rect">
+            <a:avLst/>
+          </a:prstGeom>
+          <a:noFill/>
+          <a:ln w="63500">
+            <a:solidFill>
+              <a:schemeClr val="accent6">
+                <a:lumMod val="60000"/>
+                <a:lumOff val="40000"/>
+              </a:schemeClr>
+            </a:solidFill>
+          </a:ln>
+        </p:spPr>
+        <p:style>
+          <a:lnRef idx="2">
+            <a:schemeClr val="accent1">
+              <a:shade val="15000"/>
+            </a:schemeClr>
+          </a:lnRef>
+          <a:fillRef idx="1">
+            <a:schemeClr val="accent1"/>
+          </a:fillRef>
+          <a:effectRef idx="0">
+            <a:schemeClr val="accent1"/>
+          </a:effectRef>
+          <a:fontRef idx="minor">
+            <a:schemeClr val="lt1"/>
+          </a:fontRef>
+        </p:style>
+        <p:txBody>
+          <a:bodyPr rtlCol="0" anchor="ctr"/>
+          <a:lstStyle/>
+          <a:p>
+            <a:pPr algn="ctr"/>
+            <a:endParaRPr lang="en-US" sz="1500" dirty="0">
+              <a:solidFill>
+                <a:schemeClr val="tx1"/>
+              </a:solidFill>
+            </a:endParaRPr>
+          </a:p>
+        </p:txBody>
+      </p:sp>
+      <p:sp>
+        <p:nvSpPr>
+          <p:cNvPr id="105" name="Rectangle 104">
+            <a:extLst>
+              <a:ext uri="{FF2B5EF4-FFF2-40B4-BE49-F238E27FC236}">
+                <a16:creationId xmlns:a16="http://schemas.microsoft.com/office/drawing/2014/main" id="{9DF8F386-DE6A-C81C-3983-6AD19D95D2F2}"/>
+              </a:ext>
+            </a:extLst>
+          </p:cNvPr>
+          <p:cNvSpPr/>
+          <p:nvPr/>
+        </p:nvSpPr>
+        <p:spPr>
+          <a:xfrm>
+            <a:off x="11339861" y="635033"/>
+            <a:ext cx="388596" cy="226799"/>
+          </a:xfrm>
+          <a:prstGeom prst="rect">
+            <a:avLst/>
+          </a:prstGeom>
+          <a:noFill/>
+          <a:ln w="63500">
+            <a:solidFill>
+              <a:schemeClr val="accent6">
+                <a:lumMod val="60000"/>
+                <a:lumOff val="40000"/>
+              </a:schemeClr>
+            </a:solidFill>
+          </a:ln>
+        </p:spPr>
+        <p:style>
+          <a:lnRef idx="2">
+            <a:schemeClr val="accent1">
+              <a:shade val="15000"/>
+            </a:schemeClr>
+          </a:lnRef>
+          <a:fillRef idx="1">
+            <a:schemeClr val="accent1"/>
+          </a:fillRef>
+          <a:effectRef idx="0">
+            <a:schemeClr val="accent1"/>
+          </a:effectRef>
+          <a:fontRef idx="minor">
+            <a:schemeClr val="lt1"/>
+          </a:fontRef>
+        </p:style>
+        <p:txBody>
+          <a:bodyPr rtlCol="0" anchor="ctr"/>
+          <a:lstStyle/>
+          <a:p>
+            <a:pPr algn="ctr"/>
+            <a:endParaRPr lang="en-US" sz="1500" dirty="0">
+              <a:solidFill>
+                <a:schemeClr val="tx1"/>
+              </a:solidFill>
+            </a:endParaRPr>
+          </a:p>
+        </p:txBody>
+      </p:sp>
+      <p:sp>
+        <p:nvSpPr>
+          <p:cNvPr id="106" name="Rectangle 105">
+            <a:extLst>
+              <a:ext uri="{FF2B5EF4-FFF2-40B4-BE49-F238E27FC236}">
+                <a16:creationId xmlns:a16="http://schemas.microsoft.com/office/drawing/2014/main" id="{567871EC-2DE2-82C0-301E-49FABD31B38B}"/>
+              </a:ext>
+            </a:extLst>
+          </p:cNvPr>
+          <p:cNvSpPr/>
+          <p:nvPr/>
+        </p:nvSpPr>
+        <p:spPr>
+          <a:xfrm>
+            <a:off x="10902663" y="954378"/>
+            <a:ext cx="388596" cy="226799"/>
+          </a:xfrm>
+          <a:prstGeom prst="rect">
+            <a:avLst/>
+          </a:prstGeom>
+          <a:noFill/>
+          <a:ln w="63500">
+            <a:solidFill>
+              <a:schemeClr val="accent6">
+                <a:lumMod val="60000"/>
+                <a:lumOff val="40000"/>
+              </a:schemeClr>
+            </a:solidFill>
+          </a:ln>
+        </p:spPr>
+        <p:style>
+          <a:lnRef idx="2">
+            <a:schemeClr val="accent1">
+              <a:shade val="15000"/>
+            </a:schemeClr>
+          </a:lnRef>
+          <a:fillRef idx="1">
+            <a:schemeClr val="accent1"/>
+          </a:fillRef>
+          <a:effectRef idx="0">
+            <a:schemeClr val="accent1"/>
+          </a:effectRef>
+          <a:fontRef idx="minor">
+            <a:schemeClr val="lt1"/>
+          </a:fontRef>
+        </p:style>
+        <p:txBody>
+          <a:bodyPr rtlCol="0" anchor="ctr"/>
+          <a:lstStyle/>
+          <a:p>
+            <a:pPr algn="ctr"/>
+            <a:endParaRPr lang="en-US" sz="1500" dirty="0">
+              <a:solidFill>
+                <a:schemeClr val="tx1"/>
+              </a:solidFill>
+            </a:endParaRPr>
+          </a:p>
+        </p:txBody>
+      </p:sp>
+      <p:sp>
+        <p:nvSpPr>
+          <p:cNvPr id="107" name="Rectangle 106">
+            <a:extLst>
+              <a:ext uri="{FF2B5EF4-FFF2-40B4-BE49-F238E27FC236}">
+                <a16:creationId xmlns:a16="http://schemas.microsoft.com/office/drawing/2014/main" id="{6754C84D-F526-7234-148D-C82BDF8A7918}"/>
+              </a:ext>
+            </a:extLst>
+          </p:cNvPr>
+          <p:cNvSpPr/>
+          <p:nvPr/>
+        </p:nvSpPr>
+        <p:spPr>
+          <a:xfrm>
+            <a:off x="11346565" y="954378"/>
+            <a:ext cx="388596" cy="226799"/>
+          </a:xfrm>
+          <a:prstGeom prst="rect">
+            <a:avLst/>
+          </a:prstGeom>
+          <a:noFill/>
+          <a:ln w="63500">
+            <a:solidFill>
+              <a:schemeClr val="accent6">
+                <a:lumMod val="60000"/>
+                <a:lumOff val="40000"/>
+              </a:schemeClr>
+            </a:solidFill>
+          </a:ln>
+        </p:spPr>
+        <p:style>
+          <a:lnRef idx="2">
+            <a:schemeClr val="accent1">
+              <a:shade val="15000"/>
+            </a:schemeClr>
+          </a:lnRef>
+          <a:fillRef idx="1">
+            <a:schemeClr val="accent1"/>
+          </a:fillRef>
+          <a:effectRef idx="0">
+            <a:schemeClr val="accent1"/>
+          </a:effectRef>
+          <a:fontRef idx="minor">
+            <a:schemeClr val="lt1"/>
+          </a:fontRef>
+        </p:style>
+        <p:txBody>
+          <a:bodyPr rtlCol="0" anchor="ctr"/>
+          <a:lstStyle/>
+          <a:p>
+            <a:pPr algn="ctr"/>
+            <a:endParaRPr lang="en-US" sz="1500" dirty="0">
+              <a:solidFill>
+                <a:schemeClr val="tx1"/>
+              </a:solidFill>
+            </a:endParaRPr>
+          </a:p>
+        </p:txBody>
+      </p:sp>
+      <p:sp>
+        <p:nvSpPr>
+          <p:cNvPr id="108" name="Rectangle 107">
+            <a:extLst>
+              <a:ext uri="{FF2B5EF4-FFF2-40B4-BE49-F238E27FC236}">
+                <a16:creationId xmlns:a16="http://schemas.microsoft.com/office/drawing/2014/main" id="{557CEB6B-CE63-245D-26FD-0228FF281A2F}"/>
+              </a:ext>
+            </a:extLst>
+          </p:cNvPr>
+          <p:cNvSpPr/>
+          <p:nvPr/>
+        </p:nvSpPr>
+        <p:spPr>
+          <a:xfrm>
+            <a:off x="10894633" y="1284632"/>
+            <a:ext cx="388596" cy="226799"/>
+          </a:xfrm>
+          <a:prstGeom prst="rect">
+            <a:avLst/>
+          </a:prstGeom>
+          <a:noFill/>
+          <a:ln w="63500">
+            <a:solidFill>
+              <a:schemeClr val="accent6">
+                <a:lumMod val="60000"/>
+                <a:lumOff val="40000"/>
+              </a:schemeClr>
+            </a:solidFill>
+          </a:ln>
+        </p:spPr>
+        <p:style>
+          <a:lnRef idx="2">
+            <a:schemeClr val="accent1">
+              <a:shade val="15000"/>
+            </a:schemeClr>
+          </a:lnRef>
+          <a:fillRef idx="1">
+            <a:schemeClr val="accent1"/>
+          </a:fillRef>
+          <a:effectRef idx="0">
+            <a:schemeClr val="accent1"/>
+          </a:effectRef>
+          <a:fontRef idx="minor">
+            <a:schemeClr val="lt1"/>
+          </a:fontRef>
+        </p:style>
+        <p:txBody>
+          <a:bodyPr rtlCol="0" anchor="ctr"/>
+          <a:lstStyle/>
+          <a:p>
+            <a:pPr algn="ctr"/>
+            <a:endParaRPr lang="en-US" sz="1500" dirty="0">
+              <a:solidFill>
+                <a:schemeClr val="tx1"/>
+              </a:solidFill>
+            </a:endParaRPr>
+          </a:p>
+        </p:txBody>
+      </p:sp>
+      <p:sp>
+        <p:nvSpPr>
+          <p:cNvPr id="109" name="Rectangle 108">
+            <a:extLst>
+              <a:ext uri="{FF2B5EF4-FFF2-40B4-BE49-F238E27FC236}">
+                <a16:creationId xmlns:a16="http://schemas.microsoft.com/office/drawing/2014/main" id="{928430B5-ECF1-62B4-716A-52B37C48188D}"/>
+              </a:ext>
+            </a:extLst>
+          </p:cNvPr>
+          <p:cNvSpPr/>
+          <p:nvPr/>
+        </p:nvSpPr>
+        <p:spPr>
+          <a:xfrm>
+            <a:off x="11338535" y="1284632"/>
+            <a:ext cx="388596" cy="226799"/>
+          </a:xfrm>
+          <a:prstGeom prst="rect">
+            <a:avLst/>
+          </a:prstGeom>
+          <a:noFill/>
+          <a:ln w="63500">
+            <a:solidFill>
+              <a:schemeClr val="accent6">
+                <a:lumMod val="60000"/>
+                <a:lumOff val="40000"/>
+              </a:schemeClr>
+            </a:solidFill>
+          </a:ln>
+        </p:spPr>
+        <p:style>
+          <a:lnRef idx="2">
+            <a:schemeClr val="accent1">
+              <a:shade val="15000"/>
+            </a:schemeClr>
+          </a:lnRef>
+          <a:fillRef idx="1">
+            <a:schemeClr val="accent1"/>
+          </a:fillRef>
+          <a:effectRef idx="0">
+            <a:schemeClr val="accent1"/>
+          </a:effectRef>
+          <a:fontRef idx="minor">
+            <a:schemeClr val="lt1"/>
+          </a:fontRef>
+        </p:style>
+        <p:txBody>
+          <a:bodyPr rtlCol="0" anchor="ctr"/>
+          <a:lstStyle/>
+          <a:p>
+            <a:pPr algn="ctr"/>
+            <a:endParaRPr lang="en-US" sz="1500" dirty="0">
+              <a:solidFill>
+                <a:schemeClr val="tx1"/>
+              </a:solidFill>
+            </a:endParaRPr>
+          </a:p>
+        </p:txBody>
+      </p:sp>
+      <p:sp>
+        <p:nvSpPr>
+          <p:cNvPr id="110" name="Rectangle 109">
+            <a:extLst>
+              <a:ext uri="{FF2B5EF4-FFF2-40B4-BE49-F238E27FC236}">
+                <a16:creationId xmlns:a16="http://schemas.microsoft.com/office/drawing/2014/main" id="{F059CA45-FCEE-7F3C-37D9-1EE14D043128}"/>
+              </a:ext>
+            </a:extLst>
+          </p:cNvPr>
+          <p:cNvSpPr/>
+          <p:nvPr/>
+        </p:nvSpPr>
+        <p:spPr>
+          <a:xfrm>
+            <a:off x="10910074" y="1871123"/>
+            <a:ext cx="388596" cy="226799"/>
+          </a:xfrm>
+          <a:prstGeom prst="rect">
+            <a:avLst/>
+          </a:prstGeom>
+          <a:noFill/>
+          <a:ln w="63500">
+            <a:solidFill>
+              <a:schemeClr val="accent6">
+                <a:lumMod val="60000"/>
+                <a:lumOff val="40000"/>
+              </a:schemeClr>
+            </a:solidFill>
+          </a:ln>
+        </p:spPr>
+        <p:style>
+          <a:lnRef idx="2">
+            <a:schemeClr val="accent1">
+              <a:shade val="15000"/>
+            </a:schemeClr>
+          </a:lnRef>
+          <a:fillRef idx="1">
+            <a:schemeClr val="accent1"/>
+          </a:fillRef>
+          <a:effectRef idx="0">
+            <a:schemeClr val="accent1"/>
+          </a:effectRef>
+          <a:fontRef idx="minor">
+            <a:schemeClr val="lt1"/>
+          </a:fontRef>
+        </p:style>
+        <p:txBody>
+          <a:bodyPr rtlCol="0" anchor="ctr"/>
+          <a:lstStyle/>
+          <a:p>
+            <a:pPr algn="ctr"/>
+            <a:endParaRPr lang="en-US" sz="1500" dirty="0">
+              <a:solidFill>
+                <a:schemeClr val="tx1"/>
+              </a:solidFill>
+            </a:endParaRPr>
+          </a:p>
+        </p:txBody>
+      </p:sp>
+      <p:sp>
+        <p:nvSpPr>
+          <p:cNvPr id="111" name="Rectangle 110">
+            <a:extLst>
+              <a:ext uri="{FF2B5EF4-FFF2-40B4-BE49-F238E27FC236}">
+                <a16:creationId xmlns:a16="http://schemas.microsoft.com/office/drawing/2014/main" id="{DFD24575-8ED2-6807-FB28-DB2C48940AB3}"/>
+              </a:ext>
+            </a:extLst>
+          </p:cNvPr>
+          <p:cNvSpPr/>
+          <p:nvPr/>
+        </p:nvSpPr>
+        <p:spPr>
+          <a:xfrm>
+            <a:off x="11353976" y="1871123"/>
+            <a:ext cx="388596" cy="226799"/>
+          </a:xfrm>
+          <a:prstGeom prst="rect">
+            <a:avLst/>
+          </a:prstGeom>
+          <a:noFill/>
+          <a:ln w="63500">
+            <a:solidFill>
+              <a:schemeClr val="accent6">
+                <a:lumMod val="60000"/>
+                <a:lumOff val="40000"/>
+              </a:schemeClr>
+            </a:solidFill>
+          </a:ln>
+        </p:spPr>
+        <p:style>
+          <a:lnRef idx="2">
+            <a:schemeClr val="accent1">
+              <a:shade val="15000"/>
+            </a:schemeClr>
+          </a:lnRef>
+          <a:fillRef idx="1">
+            <a:schemeClr val="accent1"/>
+          </a:fillRef>
+          <a:effectRef idx="0">
+            <a:schemeClr val="accent1"/>
+          </a:effectRef>
+          <a:fontRef idx="minor">
+            <a:schemeClr val="lt1"/>
+          </a:fontRef>
+        </p:style>
+        <p:txBody>
+          <a:bodyPr rtlCol="0" anchor="ctr"/>
+          <a:lstStyle/>
+          <a:p>
+            <a:pPr algn="ctr"/>
+            <a:endParaRPr lang="en-US" sz="1500" dirty="0">
+              <a:solidFill>
+                <a:schemeClr val="tx1"/>
+              </a:solidFill>
+            </a:endParaRPr>
+          </a:p>
+        </p:txBody>
+      </p:sp>
+      <p:sp>
+        <p:nvSpPr>
+          <p:cNvPr id="112" name="Rectangle 111">
+            <a:extLst>
+              <a:ext uri="{FF2B5EF4-FFF2-40B4-BE49-F238E27FC236}">
+                <a16:creationId xmlns:a16="http://schemas.microsoft.com/office/drawing/2014/main" id="{E1CB5F0E-460A-63CD-0ECB-8D973260C190}"/>
+              </a:ext>
+            </a:extLst>
+          </p:cNvPr>
+          <p:cNvSpPr/>
+          <p:nvPr/>
+        </p:nvSpPr>
+        <p:spPr>
+          <a:xfrm>
+            <a:off x="10914062" y="2201377"/>
+            <a:ext cx="388596" cy="226799"/>
+          </a:xfrm>
+          <a:prstGeom prst="rect">
+            <a:avLst/>
+          </a:prstGeom>
+          <a:noFill/>
+          <a:ln w="63500">
+            <a:solidFill>
+              <a:schemeClr val="accent6">
+                <a:lumMod val="60000"/>
+                <a:lumOff val="40000"/>
+              </a:schemeClr>
+            </a:solidFill>
+          </a:ln>
+        </p:spPr>
+        <p:style>
+          <a:lnRef idx="2">
+            <a:schemeClr val="accent1">
+              <a:shade val="15000"/>
+            </a:schemeClr>
+          </a:lnRef>
+          <a:fillRef idx="1">
+            <a:schemeClr val="accent1"/>
+          </a:fillRef>
+          <a:effectRef idx="0">
+            <a:schemeClr val="accent1"/>
+          </a:effectRef>
+          <a:fontRef idx="minor">
+            <a:schemeClr val="lt1"/>
+          </a:fontRef>
+        </p:style>
+        <p:txBody>
+          <a:bodyPr rtlCol="0" anchor="ctr"/>
+          <a:lstStyle/>
+          <a:p>
+            <a:pPr algn="ctr"/>
+            <a:endParaRPr lang="en-US" sz="1500" dirty="0">
+              <a:solidFill>
+                <a:schemeClr val="tx1"/>
+              </a:solidFill>
+            </a:endParaRPr>
+          </a:p>
+        </p:txBody>
+      </p:sp>
+      <p:sp>
+        <p:nvSpPr>
+          <p:cNvPr id="113" name="Rectangle 112">
+            <a:extLst>
+              <a:ext uri="{FF2B5EF4-FFF2-40B4-BE49-F238E27FC236}">
+                <a16:creationId xmlns:a16="http://schemas.microsoft.com/office/drawing/2014/main" id="{A7D0853E-CB12-D596-9C67-641FED698321}"/>
+              </a:ext>
+            </a:extLst>
+          </p:cNvPr>
+          <p:cNvSpPr/>
+          <p:nvPr/>
+        </p:nvSpPr>
+        <p:spPr>
+          <a:xfrm>
+            <a:off x="11357964" y="2201377"/>
+            <a:ext cx="388596" cy="226799"/>
+          </a:xfrm>
+          <a:prstGeom prst="rect">
+            <a:avLst/>
+          </a:prstGeom>
+          <a:noFill/>
+          <a:ln w="63500">
+            <a:solidFill>
+              <a:schemeClr val="accent6">
+                <a:lumMod val="60000"/>
+                <a:lumOff val="40000"/>
+              </a:schemeClr>
+            </a:solidFill>
+          </a:ln>
+        </p:spPr>
+        <p:style>
+          <a:lnRef idx="2">
+            <a:schemeClr val="accent1">
+              <a:shade val="15000"/>
+            </a:schemeClr>
+          </a:lnRef>
+          <a:fillRef idx="1">
+            <a:schemeClr val="accent1"/>
+          </a:fillRef>
+          <a:effectRef idx="0">
+            <a:schemeClr val="accent1"/>
+          </a:effectRef>
+          <a:fontRef idx="minor">
+            <a:schemeClr val="lt1"/>
+          </a:fontRef>
+        </p:style>
+        <p:txBody>
+          <a:bodyPr rtlCol="0" anchor="ctr"/>
+          <a:lstStyle/>
+          <a:p>
+            <a:pPr algn="ctr"/>
+            <a:endParaRPr lang="en-US" sz="1500" dirty="0">
+              <a:solidFill>
+                <a:schemeClr val="tx1"/>
+              </a:solidFill>
+            </a:endParaRPr>
+          </a:p>
+        </p:txBody>
+      </p:sp>
+      <p:sp>
+        <p:nvSpPr>
+          <p:cNvPr id="114" name="Rectangle 113">
+            <a:extLst>
+              <a:ext uri="{FF2B5EF4-FFF2-40B4-BE49-F238E27FC236}">
+                <a16:creationId xmlns:a16="http://schemas.microsoft.com/office/drawing/2014/main" id="{C24CEE64-966C-0EC0-1916-A6F461F74620}"/>
+              </a:ext>
+            </a:extLst>
+          </p:cNvPr>
+          <p:cNvSpPr/>
+          <p:nvPr/>
+        </p:nvSpPr>
+        <p:spPr>
+          <a:xfrm>
+            <a:off x="10915129" y="2525875"/>
+            <a:ext cx="388596" cy="226799"/>
+          </a:xfrm>
+          <a:prstGeom prst="rect">
+            <a:avLst/>
+          </a:prstGeom>
+          <a:noFill/>
+          <a:ln w="63500">
+            <a:solidFill>
+              <a:schemeClr val="accent6">
+                <a:lumMod val="60000"/>
+                <a:lumOff val="40000"/>
+              </a:schemeClr>
+            </a:solidFill>
+          </a:ln>
+        </p:spPr>
+        <p:style>
+          <a:lnRef idx="2">
+            <a:schemeClr val="accent1">
+              <a:shade val="15000"/>
+            </a:schemeClr>
+          </a:lnRef>
+          <a:fillRef idx="1">
+            <a:schemeClr val="accent1"/>
+          </a:fillRef>
+          <a:effectRef idx="0">
+            <a:schemeClr val="accent1"/>
+          </a:effectRef>
+          <a:fontRef idx="minor">
+            <a:schemeClr val="lt1"/>
+          </a:fontRef>
+        </p:style>
+        <p:txBody>
+          <a:bodyPr rtlCol="0" anchor="ctr"/>
+          <a:lstStyle/>
+          <a:p>
+            <a:pPr algn="ctr"/>
+            <a:endParaRPr lang="en-US" sz="1500" dirty="0">
+              <a:solidFill>
+                <a:schemeClr val="tx1"/>
+              </a:solidFill>
+            </a:endParaRPr>
+          </a:p>
+        </p:txBody>
+      </p:sp>
+      <p:sp>
+        <p:nvSpPr>
+          <p:cNvPr id="115" name="Rectangle 114">
+            <a:extLst>
+              <a:ext uri="{FF2B5EF4-FFF2-40B4-BE49-F238E27FC236}">
+                <a16:creationId xmlns:a16="http://schemas.microsoft.com/office/drawing/2014/main" id="{566BEFF8-6DFD-1B67-C0A3-9066DA53CC4E}"/>
+              </a:ext>
+            </a:extLst>
+          </p:cNvPr>
+          <p:cNvSpPr/>
+          <p:nvPr/>
+        </p:nvSpPr>
+        <p:spPr>
+          <a:xfrm>
+            <a:off x="11359031" y="2525875"/>
+            <a:ext cx="388596" cy="226799"/>
+          </a:xfrm>
+          <a:prstGeom prst="rect">
+            <a:avLst/>
+          </a:prstGeom>
+          <a:noFill/>
+          <a:ln w="63500">
+            <a:solidFill>
+              <a:schemeClr val="accent6">
+                <a:lumMod val="60000"/>
+                <a:lumOff val="40000"/>
+              </a:schemeClr>
+            </a:solidFill>
+          </a:ln>
+        </p:spPr>
+        <p:style>
+          <a:lnRef idx="2">
+            <a:schemeClr val="accent1">
+              <a:shade val="15000"/>
+            </a:schemeClr>
+          </a:lnRef>
+          <a:fillRef idx="1">
+            <a:schemeClr val="accent1"/>
+          </a:fillRef>
+          <a:effectRef idx="0">
+            <a:schemeClr val="accent1"/>
+          </a:effectRef>
+          <a:fontRef idx="minor">
+            <a:schemeClr val="lt1"/>
+          </a:fontRef>
+        </p:style>
+        <p:txBody>
+          <a:bodyPr rtlCol="0" anchor="ctr"/>
+          <a:lstStyle/>
+          <a:p>
+            <a:pPr algn="ctr"/>
+            <a:endParaRPr lang="en-US" sz="1500" dirty="0">
+              <a:solidFill>
+                <a:schemeClr val="tx1"/>
+              </a:solidFill>
+            </a:endParaRPr>
+          </a:p>
+        </p:txBody>
+      </p:sp>
+    </p:spTree>
+    <p:extLst>
+      <p:ext uri="{BB962C8B-B14F-4D97-AF65-F5344CB8AC3E}">
+        <p14:creationId xmlns:p14="http://schemas.microsoft.com/office/powerpoint/2010/main" val="1898038801"/>
       </p:ext>
     </p:extLst>
   </p:cSld>

</xml_diff>